<commit_message>
Change layout + Page CBBH
</commit_message>
<xml_diff>
--- a/3. Layout/Layout_KPIs_new.pptx
+++ b/3. Layout/Layout_KPIs_new.pptx
@@ -4,8 +4,12 @@
   <p:sldMasterIdLst>
     <p:sldMasterId id="2147483648" r:id="rId1"/>
   </p:sldMasterIdLst>
+  <p:notesMasterIdLst>
+    <p:notesMasterId r:id="rId4"/>
+  </p:notesMasterIdLst>
   <p:sldIdLst>
     <p:sldId id="256" r:id="rId2"/>
+    <p:sldId id="257" r:id="rId3"/>
   </p:sldIdLst>
   <p:sldSz cx="12192000" cy="6858000"/>
   <p:notesSz cx="6858000" cy="9144000"/>
@@ -104,7 +108,365 @@
       </a:defRPr>
     </a:lvl9pPr>
   </p:defaultTextStyle>
+  <p:extLst>
+    <p:ext uri="{EFAFB233-063F-42B5-8137-9DF3F51BA10A}">
+      <p15:sldGuideLst xmlns:p15="http://schemas.microsoft.com/office/powerpoint/2012/main"/>
+    </p:ext>
+    <p:ext uri="{2D200454-40CA-4A62-9FC3-DE9A4176ACB9}">
+      <p15:notesGuideLst xmlns:p15="http://schemas.microsoft.com/office/powerpoint/2012/main"/>
+    </p:ext>
+  </p:extLst>
 </p:presentation>
+</file>
+
+<file path=ppt/notesMasters/notesMaster1.xml><?xml version="1.0" encoding="utf-8"?>
+<p:notesMaster xmlns:a="http://schemas.openxmlformats.org/drawingml/2006/main" xmlns:r="http://schemas.openxmlformats.org/officeDocument/2006/relationships" xmlns:p="http://schemas.openxmlformats.org/presentationml/2006/main">
+  <p:cSld>
+    <p:bg>
+      <p:bgRef idx="1001">
+        <a:schemeClr val="bg1"/>
+      </p:bgRef>
+    </p:bg>
+    <p:spTree>
+      <p:nvGrpSpPr>
+        <p:cNvPr id="1" name=""/>
+        <p:cNvGrpSpPr/>
+        <p:nvPr/>
+      </p:nvGrpSpPr>
+      <p:grpSpPr>
+        <a:xfrm>
+          <a:off x="0" y="0"/>
+          <a:ext cx="0" cy="0"/>
+          <a:chOff x="0" y="0"/>
+          <a:chExt cx="0" cy="0"/>
+        </a:xfrm>
+      </p:grpSpPr>
+      <p:sp>
+        <p:nvSpPr>
+          <p:cNvPr id="2" name="Header Placeholder 1"/>
+          <p:cNvSpPr>
+            <a:spLocks noGrp="1"/>
+          </p:cNvSpPr>
+          <p:nvPr>
+            <p:ph type="hdr" sz="quarter"/>
+          </p:nvPr>
+        </p:nvSpPr>
+        <p:spPr>
+          <a:xfrm>
+            <a:off x="0" y="0"/>
+            <a:ext cx="2971800" cy="458788"/>
+          </a:xfrm>
+          <a:prstGeom prst="rect">
+            <a:avLst/>
+          </a:prstGeom>
+        </p:spPr>
+        <p:txBody>
+          <a:bodyPr vert="horz" lIns="91440" tIns="45720" rIns="91440" bIns="45720" rtlCol="0"/>
+          <a:lstStyle>
+            <a:lvl1pPr algn="l">
+              <a:defRPr sz="1200"/>
+            </a:lvl1pPr>
+          </a:lstStyle>
+          <a:p>
+            <a:endParaRPr lang="en-AE"/>
+          </a:p>
+        </p:txBody>
+      </p:sp>
+      <p:sp>
+        <p:nvSpPr>
+          <p:cNvPr id="3" name="Date Placeholder 2"/>
+          <p:cNvSpPr>
+            <a:spLocks noGrp="1"/>
+          </p:cNvSpPr>
+          <p:nvPr>
+            <p:ph type="dt" idx="1"/>
+          </p:nvPr>
+        </p:nvSpPr>
+        <p:spPr>
+          <a:xfrm>
+            <a:off x="3884613" y="0"/>
+            <a:ext cx="2971800" cy="458788"/>
+          </a:xfrm>
+          <a:prstGeom prst="rect">
+            <a:avLst/>
+          </a:prstGeom>
+        </p:spPr>
+        <p:txBody>
+          <a:bodyPr vert="horz" lIns="91440" tIns="45720" rIns="91440" bIns="45720" rtlCol="0"/>
+          <a:lstStyle>
+            <a:lvl1pPr algn="r">
+              <a:defRPr sz="1200"/>
+            </a:lvl1pPr>
+          </a:lstStyle>
+          <a:p>
+            <a:fld id="{273F746D-BE73-4647-8050-128254BBAEE1}" type="datetimeFigureOut">
+              <a:rPr lang="en-AE" smtClean="0"/>
+              <a:t>28/10/2025</a:t>
+            </a:fld>
+            <a:endParaRPr lang="en-AE"/>
+          </a:p>
+        </p:txBody>
+      </p:sp>
+      <p:sp>
+        <p:nvSpPr>
+          <p:cNvPr id="4" name="Slide Image Placeholder 3"/>
+          <p:cNvSpPr>
+            <a:spLocks noGrp="1" noRot="1" noChangeAspect="1"/>
+          </p:cNvSpPr>
+          <p:nvPr>
+            <p:ph type="sldImg" idx="2"/>
+          </p:nvPr>
+        </p:nvSpPr>
+        <p:spPr>
+          <a:xfrm>
+            <a:off x="685800" y="1143000"/>
+            <a:ext cx="5486400" cy="3086100"/>
+          </a:xfrm>
+          <a:prstGeom prst="rect">
+            <a:avLst/>
+          </a:prstGeom>
+          <a:noFill/>
+          <a:ln w="12700">
+            <a:solidFill>
+              <a:prstClr val="black"/>
+            </a:solidFill>
+          </a:ln>
+        </p:spPr>
+        <p:txBody>
+          <a:bodyPr vert="horz" lIns="91440" tIns="45720" rIns="91440" bIns="45720" rtlCol="0" anchor="ctr"/>
+          <a:lstStyle/>
+          <a:p>
+            <a:endParaRPr lang="en-AE"/>
+          </a:p>
+        </p:txBody>
+      </p:sp>
+      <p:sp>
+        <p:nvSpPr>
+          <p:cNvPr id="5" name="Notes Placeholder 4"/>
+          <p:cNvSpPr>
+            <a:spLocks noGrp="1"/>
+          </p:cNvSpPr>
+          <p:nvPr>
+            <p:ph type="body" sz="quarter" idx="3"/>
+          </p:nvPr>
+        </p:nvSpPr>
+        <p:spPr>
+          <a:xfrm>
+            <a:off x="685800" y="4400550"/>
+            <a:ext cx="5486400" cy="3600450"/>
+          </a:xfrm>
+          <a:prstGeom prst="rect">
+            <a:avLst/>
+          </a:prstGeom>
+        </p:spPr>
+        <p:txBody>
+          <a:bodyPr vert="horz" lIns="91440" tIns="45720" rIns="91440" bIns="45720" rtlCol="0"/>
+          <a:lstStyle/>
+          <a:p>
+            <a:pPr lvl="0"/>
+            <a:r>
+              <a:rPr lang="en-US"/>
+              <a:t>Click to edit Master text styles</a:t>
+            </a:r>
+          </a:p>
+          <a:p>
+            <a:pPr lvl="1"/>
+            <a:r>
+              <a:rPr lang="en-US"/>
+              <a:t>Second level</a:t>
+            </a:r>
+          </a:p>
+          <a:p>
+            <a:pPr lvl="2"/>
+            <a:r>
+              <a:rPr lang="en-US"/>
+              <a:t>Third level</a:t>
+            </a:r>
+          </a:p>
+          <a:p>
+            <a:pPr lvl="3"/>
+            <a:r>
+              <a:rPr lang="en-US"/>
+              <a:t>Fourth level</a:t>
+            </a:r>
+          </a:p>
+          <a:p>
+            <a:pPr lvl="4"/>
+            <a:r>
+              <a:rPr lang="en-US"/>
+              <a:t>Fifth level</a:t>
+            </a:r>
+            <a:endParaRPr lang="en-AE"/>
+          </a:p>
+        </p:txBody>
+      </p:sp>
+      <p:sp>
+        <p:nvSpPr>
+          <p:cNvPr id="6" name="Footer Placeholder 5"/>
+          <p:cNvSpPr>
+            <a:spLocks noGrp="1"/>
+          </p:cNvSpPr>
+          <p:nvPr>
+            <p:ph type="ftr" sz="quarter" idx="4"/>
+          </p:nvPr>
+        </p:nvSpPr>
+        <p:spPr>
+          <a:xfrm>
+            <a:off x="0" y="8685213"/>
+            <a:ext cx="2971800" cy="458787"/>
+          </a:xfrm>
+          <a:prstGeom prst="rect">
+            <a:avLst/>
+          </a:prstGeom>
+        </p:spPr>
+        <p:txBody>
+          <a:bodyPr vert="horz" lIns="91440" tIns="45720" rIns="91440" bIns="45720" rtlCol="0" anchor="b"/>
+          <a:lstStyle>
+            <a:lvl1pPr algn="l">
+              <a:defRPr sz="1200"/>
+            </a:lvl1pPr>
+          </a:lstStyle>
+          <a:p>
+            <a:endParaRPr lang="en-AE"/>
+          </a:p>
+        </p:txBody>
+      </p:sp>
+      <p:sp>
+        <p:nvSpPr>
+          <p:cNvPr id="7" name="Slide Number Placeholder 6"/>
+          <p:cNvSpPr>
+            <a:spLocks noGrp="1"/>
+          </p:cNvSpPr>
+          <p:nvPr>
+            <p:ph type="sldNum" sz="quarter" idx="5"/>
+          </p:nvPr>
+        </p:nvSpPr>
+        <p:spPr>
+          <a:xfrm>
+            <a:off x="3884613" y="8685213"/>
+            <a:ext cx="2971800" cy="458787"/>
+          </a:xfrm>
+          <a:prstGeom prst="rect">
+            <a:avLst/>
+          </a:prstGeom>
+        </p:spPr>
+        <p:txBody>
+          <a:bodyPr vert="horz" lIns="91440" tIns="45720" rIns="91440" bIns="45720" rtlCol="0" anchor="b"/>
+          <a:lstStyle>
+            <a:lvl1pPr algn="r">
+              <a:defRPr sz="1200"/>
+            </a:lvl1pPr>
+          </a:lstStyle>
+          <a:p>
+            <a:fld id="{55469115-AC99-4087-A15C-B6FB61322BDC}" type="slidenum">
+              <a:rPr lang="en-AE" smtClean="0"/>
+              <a:t>‹#›</a:t>
+            </a:fld>
+            <a:endParaRPr lang="en-AE"/>
+          </a:p>
+        </p:txBody>
+      </p:sp>
+    </p:spTree>
+    <p:extLst>
+      <p:ext uri="{BB962C8B-B14F-4D97-AF65-F5344CB8AC3E}">
+        <p14:creationId xmlns:p14="http://schemas.microsoft.com/office/powerpoint/2010/main" val="1249457871"/>
+      </p:ext>
+    </p:extLst>
+  </p:cSld>
+  <p:clrMap bg1="lt1" tx1="dk1" bg2="lt2" tx2="dk2" accent1="accent1" accent2="accent2" accent3="accent3" accent4="accent4" accent5="accent5" accent6="accent6" hlink="hlink" folHlink="folHlink"/>
+  <p:notesStyle>
+    <a:lvl1pPr marL="0" algn="l" defTabSz="914400" rtl="0" eaLnBrk="1" latinLnBrk="0" hangingPunct="1">
+      <a:defRPr sz="1200" kern="1200">
+        <a:solidFill>
+          <a:schemeClr val="tx1"/>
+        </a:solidFill>
+        <a:latin typeface="+mn-lt"/>
+        <a:ea typeface="+mn-ea"/>
+        <a:cs typeface="+mn-cs"/>
+      </a:defRPr>
+    </a:lvl1pPr>
+    <a:lvl2pPr marL="457200" algn="l" defTabSz="914400" rtl="0" eaLnBrk="1" latinLnBrk="0" hangingPunct="1">
+      <a:defRPr sz="1200" kern="1200">
+        <a:solidFill>
+          <a:schemeClr val="tx1"/>
+        </a:solidFill>
+        <a:latin typeface="+mn-lt"/>
+        <a:ea typeface="+mn-ea"/>
+        <a:cs typeface="+mn-cs"/>
+      </a:defRPr>
+    </a:lvl2pPr>
+    <a:lvl3pPr marL="914400" algn="l" defTabSz="914400" rtl="0" eaLnBrk="1" latinLnBrk="0" hangingPunct="1">
+      <a:defRPr sz="1200" kern="1200">
+        <a:solidFill>
+          <a:schemeClr val="tx1"/>
+        </a:solidFill>
+        <a:latin typeface="+mn-lt"/>
+        <a:ea typeface="+mn-ea"/>
+        <a:cs typeface="+mn-cs"/>
+      </a:defRPr>
+    </a:lvl3pPr>
+    <a:lvl4pPr marL="1371600" algn="l" defTabSz="914400" rtl="0" eaLnBrk="1" latinLnBrk="0" hangingPunct="1">
+      <a:defRPr sz="1200" kern="1200">
+        <a:solidFill>
+          <a:schemeClr val="tx1"/>
+        </a:solidFill>
+        <a:latin typeface="+mn-lt"/>
+        <a:ea typeface="+mn-ea"/>
+        <a:cs typeface="+mn-cs"/>
+      </a:defRPr>
+    </a:lvl4pPr>
+    <a:lvl5pPr marL="1828800" algn="l" defTabSz="914400" rtl="0" eaLnBrk="1" latinLnBrk="0" hangingPunct="1">
+      <a:defRPr sz="1200" kern="1200">
+        <a:solidFill>
+          <a:schemeClr val="tx1"/>
+        </a:solidFill>
+        <a:latin typeface="+mn-lt"/>
+        <a:ea typeface="+mn-ea"/>
+        <a:cs typeface="+mn-cs"/>
+      </a:defRPr>
+    </a:lvl5pPr>
+    <a:lvl6pPr marL="2286000" algn="l" defTabSz="914400" rtl="0" eaLnBrk="1" latinLnBrk="0" hangingPunct="1">
+      <a:defRPr sz="1200" kern="1200">
+        <a:solidFill>
+          <a:schemeClr val="tx1"/>
+        </a:solidFill>
+        <a:latin typeface="+mn-lt"/>
+        <a:ea typeface="+mn-ea"/>
+        <a:cs typeface="+mn-cs"/>
+      </a:defRPr>
+    </a:lvl6pPr>
+    <a:lvl7pPr marL="2743200" algn="l" defTabSz="914400" rtl="0" eaLnBrk="1" latinLnBrk="0" hangingPunct="1">
+      <a:defRPr sz="1200" kern="1200">
+        <a:solidFill>
+          <a:schemeClr val="tx1"/>
+        </a:solidFill>
+        <a:latin typeface="+mn-lt"/>
+        <a:ea typeface="+mn-ea"/>
+        <a:cs typeface="+mn-cs"/>
+      </a:defRPr>
+    </a:lvl7pPr>
+    <a:lvl8pPr marL="3200400" algn="l" defTabSz="914400" rtl="0" eaLnBrk="1" latinLnBrk="0" hangingPunct="1">
+      <a:defRPr sz="1200" kern="1200">
+        <a:solidFill>
+          <a:schemeClr val="tx1"/>
+        </a:solidFill>
+        <a:latin typeface="+mn-lt"/>
+        <a:ea typeface="+mn-ea"/>
+        <a:cs typeface="+mn-cs"/>
+      </a:defRPr>
+    </a:lvl8pPr>
+    <a:lvl9pPr marL="3657600" algn="l" defTabSz="914400" rtl="0" eaLnBrk="1" latinLnBrk="0" hangingPunct="1">
+      <a:defRPr sz="1200" kern="1200">
+        <a:solidFill>
+          <a:schemeClr val="tx1"/>
+        </a:solidFill>
+        <a:latin typeface="+mn-lt"/>
+        <a:ea typeface="+mn-ea"/>
+        <a:cs typeface="+mn-cs"/>
+      </a:defRPr>
+    </a:lvl9pPr>
+  </p:notesStyle>
+</p:notesMaster>
 </file>
 
 <file path=ppt/slideLayouts/slideLayout1.xml><?xml version="1.0" encoding="utf-8"?>
@@ -203,8 +565,8 @@
         </p:nvSpPr>
         <p:spPr>
           <a:xfrm>
-            <a:off x="7714034" y="243452"/>
-            <a:ext cx="4105071" cy="548640"/>
+            <a:off x="6840778" y="243452"/>
+            <a:ext cx="4978327" cy="548640"/>
           </a:xfrm>
           <a:prstGeom prst="roundRect">
             <a:avLst>
@@ -245,43 +607,6 @@
           </a:p>
         </p:txBody>
       </p:sp>
-      <p:pic>
-        <p:nvPicPr>
-          <p:cNvPr id="10" name="Picture 9" descr="A blue sign with white text&#10;&#10;AI-generated content may be incorrect.">
-            <a:extLst>
-              <a:ext uri="{FF2B5EF4-FFF2-40B4-BE49-F238E27FC236}">
-                <a16:creationId xmlns:a16="http://schemas.microsoft.com/office/drawing/2014/main" id="{704FA8BA-9732-4924-91CD-02F8BE354AE6}"/>
-              </a:ext>
-            </a:extLst>
-          </p:cNvPr>
-          <p:cNvPicPr>
-            <a:picLocks noChangeAspect="1"/>
-          </p:cNvPicPr>
-          <p:nvPr userDrawn="1"/>
-        </p:nvPicPr>
-        <p:blipFill>
-          <a:blip r:embed="rId2">
-            <a:extLst>
-              <a:ext uri="{28A0092B-C50C-407E-A947-70E740481C1C}">
-                <a14:useLocalDpi xmlns:a14="http://schemas.microsoft.com/office/drawing/2010/main" val="0"/>
-              </a:ext>
-            </a:extLst>
-          </a:blip>
-          <a:srcRect l="7479" t="22968" r="10207" b="16387"/>
-          <a:stretch>
-            <a:fillRect/>
-          </a:stretch>
-        </p:blipFill>
-        <p:spPr>
-          <a:xfrm>
-            <a:off x="496110" y="341740"/>
-            <a:ext cx="1011677" cy="352064"/>
-          </a:xfrm>
-          <a:prstGeom prst="rect">
-            <a:avLst/>
-          </a:prstGeom>
-        </p:spPr>
-      </p:pic>
       <p:grpSp>
         <p:nvGrpSpPr>
           <p:cNvPr id="19" name="Group 18">
@@ -352,7 +677,7 @@
             <a:lstStyle/>
             <a:p>
               <a:pPr algn="ctr"/>
-              <a:endParaRPr lang="en-AE"/>
+              <a:endParaRPr lang="en-AE" dirty="0"/>
             </a:p>
           </p:txBody>
         </p:sp>
@@ -430,6 +755,858 @@
           </p:txBody>
         </p:sp>
       </p:grpSp>
+      <p:pic>
+        <p:nvPicPr>
+          <p:cNvPr id="3" name="Graphic 2" descr="User with solid fill">
+            <a:extLst>
+              <a:ext uri="{FF2B5EF4-FFF2-40B4-BE49-F238E27FC236}">
+                <a16:creationId xmlns:a16="http://schemas.microsoft.com/office/drawing/2014/main" id="{4BA596C4-0A83-2913-C253-B71D81F8EA2D}"/>
+              </a:ext>
+            </a:extLst>
+          </p:cNvPr>
+          <p:cNvPicPr>
+            <a:picLocks noChangeAspect="1"/>
+          </p:cNvPicPr>
+          <p:nvPr userDrawn="1"/>
+        </p:nvPicPr>
+        <p:blipFill>
+          <a:blip r:embed="rId2">
+            <a:extLst>
+              <a:ext uri="{96DAC541-7B7A-43D3-8B79-37D633B846F1}">
+                <asvg:svgBlip xmlns:asvg="http://schemas.microsoft.com/office/drawing/2016/SVG/main" r:embed="rId3"/>
+              </a:ext>
+            </a:extLst>
+          </a:blip>
+          <a:stretch>
+            <a:fillRect/>
+          </a:stretch>
+        </p:blipFill>
+        <p:spPr>
+          <a:xfrm>
+            <a:off x="381000" y="1210420"/>
+            <a:ext cx="914400" cy="914400"/>
+          </a:xfrm>
+          <a:prstGeom prst="rect">
+            <a:avLst/>
+          </a:prstGeom>
+        </p:spPr>
+      </p:pic>
+      <p:sp>
+        <p:nvSpPr>
+          <p:cNvPr id="4" name="Rectangle: Rounded Corners 3">
+            <a:extLst>
+              <a:ext uri="{FF2B5EF4-FFF2-40B4-BE49-F238E27FC236}">
+                <a16:creationId xmlns:a16="http://schemas.microsoft.com/office/drawing/2014/main" id="{7C234525-0A28-2DEA-9D3F-42F7ECDFCCAE}"/>
+              </a:ext>
+            </a:extLst>
+          </p:cNvPr>
+          <p:cNvSpPr/>
+          <p:nvPr userDrawn="1"/>
+        </p:nvSpPr>
+        <p:spPr>
+          <a:xfrm>
+            <a:off x="243840" y="2331720"/>
+            <a:ext cx="3365770" cy="4374268"/>
+          </a:xfrm>
+          <a:prstGeom prst="roundRect">
+            <a:avLst>
+              <a:gd name="adj" fmla="val 4164"/>
+            </a:avLst>
+          </a:prstGeom>
+          <a:solidFill>
+            <a:schemeClr val="bg1"/>
+          </a:solidFill>
+          <a:ln>
+            <a:noFill/>
+          </a:ln>
+        </p:spPr>
+        <p:style>
+          <a:lnRef idx="2">
+            <a:schemeClr val="accent1">
+              <a:shade val="15000"/>
+            </a:schemeClr>
+          </a:lnRef>
+          <a:fillRef idx="1">
+            <a:schemeClr val="accent1"/>
+          </a:fillRef>
+          <a:effectRef idx="0">
+            <a:schemeClr val="accent1"/>
+          </a:effectRef>
+          <a:fontRef idx="minor">
+            <a:schemeClr val="lt1"/>
+          </a:fontRef>
+        </p:style>
+        <p:txBody>
+          <a:bodyPr rtlCol="0" anchor="ctr"/>
+          <a:lstStyle/>
+          <a:p>
+            <a:pPr algn="ctr"/>
+            <a:endParaRPr lang="en-AE" dirty="0"/>
+          </a:p>
+        </p:txBody>
+      </p:sp>
+      <p:sp>
+        <p:nvSpPr>
+          <p:cNvPr id="6" name="Rectangle: Rounded Corners 5">
+            <a:extLst>
+              <a:ext uri="{FF2B5EF4-FFF2-40B4-BE49-F238E27FC236}">
+                <a16:creationId xmlns:a16="http://schemas.microsoft.com/office/drawing/2014/main" id="{7381B74B-398A-23DC-21A7-22881706FD00}"/>
+              </a:ext>
+            </a:extLst>
+          </p:cNvPr>
+          <p:cNvSpPr/>
+          <p:nvPr userDrawn="1"/>
+        </p:nvSpPr>
+        <p:spPr>
+          <a:xfrm>
+            <a:off x="3863008" y="1118979"/>
+            <a:ext cx="8085152" cy="1541093"/>
+          </a:xfrm>
+          <a:prstGeom prst="roundRect">
+            <a:avLst>
+              <a:gd name="adj" fmla="val 5243"/>
+            </a:avLst>
+          </a:prstGeom>
+          <a:solidFill>
+            <a:schemeClr val="bg1"/>
+          </a:solidFill>
+          <a:ln>
+            <a:noFill/>
+          </a:ln>
+        </p:spPr>
+        <p:style>
+          <a:lnRef idx="2">
+            <a:schemeClr val="accent1">
+              <a:shade val="15000"/>
+            </a:schemeClr>
+          </a:lnRef>
+          <a:fillRef idx="1">
+            <a:schemeClr val="accent1"/>
+          </a:fillRef>
+          <a:effectRef idx="0">
+            <a:schemeClr val="accent1"/>
+          </a:effectRef>
+          <a:fontRef idx="minor">
+            <a:schemeClr val="lt1"/>
+          </a:fontRef>
+        </p:style>
+        <p:txBody>
+          <a:bodyPr rtlCol="0" anchor="ctr"/>
+          <a:lstStyle/>
+          <a:p>
+            <a:pPr algn="ctr"/>
+            <a:endParaRPr lang="en-AE" dirty="0"/>
+          </a:p>
+        </p:txBody>
+      </p:sp>
+      <p:sp>
+        <p:nvSpPr>
+          <p:cNvPr id="9" name="Rectangle: Rounded Corners 8">
+            <a:extLst>
+              <a:ext uri="{FF2B5EF4-FFF2-40B4-BE49-F238E27FC236}">
+                <a16:creationId xmlns:a16="http://schemas.microsoft.com/office/drawing/2014/main" id="{DA9803B7-FD84-EE62-F93A-3B853902451D}"/>
+              </a:ext>
+            </a:extLst>
+          </p:cNvPr>
+          <p:cNvSpPr/>
+          <p:nvPr userDrawn="1"/>
+        </p:nvSpPr>
+        <p:spPr>
+          <a:xfrm>
+            <a:off x="3863008" y="2818015"/>
+            <a:ext cx="8085152" cy="2859578"/>
+          </a:xfrm>
+          <a:prstGeom prst="roundRect">
+            <a:avLst>
+              <a:gd name="adj" fmla="val 4455"/>
+            </a:avLst>
+          </a:prstGeom>
+          <a:solidFill>
+            <a:schemeClr val="bg1"/>
+          </a:solidFill>
+          <a:ln>
+            <a:noFill/>
+          </a:ln>
+        </p:spPr>
+        <p:style>
+          <a:lnRef idx="2">
+            <a:schemeClr val="accent1">
+              <a:shade val="15000"/>
+            </a:schemeClr>
+          </a:lnRef>
+          <a:fillRef idx="1">
+            <a:schemeClr val="accent1"/>
+          </a:fillRef>
+          <a:effectRef idx="0">
+            <a:schemeClr val="accent1"/>
+          </a:effectRef>
+          <a:fontRef idx="minor">
+            <a:schemeClr val="lt1"/>
+          </a:fontRef>
+        </p:style>
+        <p:txBody>
+          <a:bodyPr rtlCol="0" anchor="ctr"/>
+          <a:lstStyle/>
+          <a:p>
+            <a:pPr algn="ctr"/>
+            <a:endParaRPr lang="en-AE" dirty="0"/>
+          </a:p>
+        </p:txBody>
+      </p:sp>
+      <p:sp>
+        <p:nvSpPr>
+          <p:cNvPr id="11" name="Rectangle: Rounded Corners 10">
+            <a:extLst>
+              <a:ext uri="{FF2B5EF4-FFF2-40B4-BE49-F238E27FC236}">
+                <a16:creationId xmlns:a16="http://schemas.microsoft.com/office/drawing/2014/main" id="{57F177CD-4051-0762-4ED1-DBAC044376EA}"/>
+              </a:ext>
+            </a:extLst>
+          </p:cNvPr>
+          <p:cNvSpPr/>
+          <p:nvPr userDrawn="1"/>
+        </p:nvSpPr>
+        <p:spPr>
+          <a:xfrm>
+            <a:off x="345600" y="2497428"/>
+            <a:ext cx="1554480" cy="731520"/>
+          </a:xfrm>
+          <a:prstGeom prst="roundRect">
+            <a:avLst>
+              <a:gd name="adj" fmla="val 50000"/>
+            </a:avLst>
+          </a:prstGeom>
+          <a:solidFill>
+            <a:srgbClr val="D9D9D9">
+              <a:alpha val="50000"/>
+            </a:srgbClr>
+          </a:solidFill>
+          <a:ln>
+            <a:noFill/>
+          </a:ln>
+        </p:spPr>
+        <p:style>
+          <a:lnRef idx="2">
+            <a:schemeClr val="accent1">
+              <a:shade val="15000"/>
+            </a:schemeClr>
+          </a:lnRef>
+          <a:fillRef idx="1">
+            <a:schemeClr val="accent1"/>
+          </a:fillRef>
+          <a:effectRef idx="0">
+            <a:schemeClr val="accent1"/>
+          </a:effectRef>
+          <a:fontRef idx="minor">
+            <a:schemeClr val="lt1"/>
+          </a:fontRef>
+        </p:style>
+        <p:txBody>
+          <a:bodyPr rtlCol="0" anchor="t"/>
+          <a:lstStyle/>
+          <a:p>
+            <a:pPr algn="ctr"/>
+            <a:r>
+              <a:rPr lang="en-US" sz="1000" b="1" dirty="0">
+                <a:solidFill>
+                  <a:schemeClr val="tx1"/>
+                </a:solidFill>
+                <a:latin typeface="Arial" panose="020B0604020202020204" pitchFamily="34" charset="0"/>
+                <a:cs typeface="Arial" panose="020B0604020202020204" pitchFamily="34" charset="0"/>
+              </a:rPr>
+              <a:t>ĐIỂM THỰC HIỆN</a:t>
+            </a:r>
+            <a:endParaRPr lang="en-AE" sz="1000" b="1" dirty="0">
+              <a:solidFill>
+                <a:schemeClr val="tx1"/>
+              </a:solidFill>
+              <a:latin typeface="Arial" panose="020B0604020202020204" pitchFamily="34" charset="0"/>
+              <a:cs typeface="Arial" panose="020B0604020202020204" pitchFamily="34" charset="0"/>
+            </a:endParaRPr>
+          </a:p>
+        </p:txBody>
+      </p:sp>
+      <p:sp>
+        <p:nvSpPr>
+          <p:cNvPr id="23" name="Rectangle: Rounded Corners 22">
+            <a:extLst>
+              <a:ext uri="{FF2B5EF4-FFF2-40B4-BE49-F238E27FC236}">
+                <a16:creationId xmlns:a16="http://schemas.microsoft.com/office/drawing/2014/main" id="{A2B9992C-97E2-0DD8-F153-895941905959}"/>
+              </a:ext>
+            </a:extLst>
+          </p:cNvPr>
+          <p:cNvSpPr/>
+          <p:nvPr userDrawn="1"/>
+        </p:nvSpPr>
+        <p:spPr>
+          <a:xfrm>
+            <a:off x="1978930" y="2497428"/>
+            <a:ext cx="1554480" cy="731520"/>
+          </a:xfrm>
+          <a:prstGeom prst="roundRect">
+            <a:avLst>
+              <a:gd name="adj" fmla="val 50000"/>
+            </a:avLst>
+          </a:prstGeom>
+          <a:solidFill>
+            <a:srgbClr val="D9D9D9">
+              <a:alpha val="50000"/>
+            </a:srgbClr>
+          </a:solidFill>
+          <a:ln>
+            <a:noFill/>
+          </a:ln>
+        </p:spPr>
+        <p:style>
+          <a:lnRef idx="2">
+            <a:schemeClr val="accent1">
+              <a:shade val="15000"/>
+            </a:schemeClr>
+          </a:lnRef>
+          <a:fillRef idx="1">
+            <a:schemeClr val="accent1"/>
+          </a:fillRef>
+          <a:effectRef idx="0">
+            <a:schemeClr val="accent1"/>
+          </a:effectRef>
+          <a:fontRef idx="minor">
+            <a:schemeClr val="lt1"/>
+          </a:fontRef>
+        </p:style>
+        <p:txBody>
+          <a:bodyPr rtlCol="0" anchor="t"/>
+          <a:lstStyle/>
+          <a:p>
+            <a:pPr algn="ctr"/>
+            <a:r>
+              <a:rPr lang="en-US" sz="1000" b="1" dirty="0">
+                <a:solidFill>
+                  <a:schemeClr val="tx1"/>
+                </a:solidFill>
+                <a:latin typeface="Arial" panose="020B0604020202020204" pitchFamily="34" charset="0"/>
+                <a:cs typeface="Arial" panose="020B0604020202020204" pitchFamily="34" charset="0"/>
+              </a:rPr>
+              <a:t>ĐIỂM KẾ HOẠCH</a:t>
+            </a:r>
+            <a:endParaRPr lang="en-AE" sz="1000" b="1" dirty="0">
+              <a:solidFill>
+                <a:schemeClr val="tx1"/>
+              </a:solidFill>
+              <a:latin typeface="Arial" panose="020B0604020202020204" pitchFamily="34" charset="0"/>
+              <a:cs typeface="Arial" panose="020B0604020202020204" pitchFamily="34" charset="0"/>
+            </a:endParaRPr>
+          </a:p>
+        </p:txBody>
+      </p:sp>
+      <p:sp>
+        <p:nvSpPr>
+          <p:cNvPr id="24" name="Rectangle: Rounded Corners 23">
+            <a:extLst>
+              <a:ext uri="{FF2B5EF4-FFF2-40B4-BE49-F238E27FC236}">
+                <a16:creationId xmlns:a16="http://schemas.microsoft.com/office/drawing/2014/main" id="{DA0F010F-BFEF-9D32-5FAB-FD2337C45623}"/>
+              </a:ext>
+            </a:extLst>
+          </p:cNvPr>
+          <p:cNvSpPr/>
+          <p:nvPr userDrawn="1"/>
+        </p:nvSpPr>
+        <p:spPr>
+          <a:xfrm>
+            <a:off x="345600" y="3394656"/>
+            <a:ext cx="1554480" cy="731520"/>
+          </a:xfrm>
+          <a:prstGeom prst="roundRect">
+            <a:avLst>
+              <a:gd name="adj" fmla="val 50000"/>
+            </a:avLst>
+          </a:prstGeom>
+          <a:solidFill>
+            <a:srgbClr val="D9D9D9">
+              <a:alpha val="50000"/>
+            </a:srgbClr>
+          </a:solidFill>
+          <a:ln>
+            <a:noFill/>
+          </a:ln>
+        </p:spPr>
+        <p:style>
+          <a:lnRef idx="2">
+            <a:schemeClr val="accent1">
+              <a:shade val="15000"/>
+            </a:schemeClr>
+          </a:lnRef>
+          <a:fillRef idx="1">
+            <a:schemeClr val="accent1"/>
+          </a:fillRef>
+          <a:effectRef idx="0">
+            <a:schemeClr val="accent1"/>
+          </a:effectRef>
+          <a:fontRef idx="minor">
+            <a:schemeClr val="lt1"/>
+          </a:fontRef>
+        </p:style>
+        <p:txBody>
+          <a:bodyPr rtlCol="0" anchor="t"/>
+          <a:lstStyle/>
+          <a:p>
+            <a:pPr algn="ctr"/>
+            <a:r>
+              <a:rPr lang="en-US" sz="1000" b="1" dirty="0">
+                <a:solidFill>
+                  <a:schemeClr val="tx1"/>
+                </a:solidFill>
+                <a:latin typeface="Arial" panose="020B0604020202020204" pitchFamily="34" charset="0"/>
+                <a:cs typeface="Arial" panose="020B0604020202020204" pitchFamily="34" charset="0"/>
+              </a:rPr>
+              <a:t>% THỰC HIỆN</a:t>
+            </a:r>
+            <a:endParaRPr lang="en-AE" sz="1000" b="1" dirty="0">
+              <a:solidFill>
+                <a:schemeClr val="tx1"/>
+              </a:solidFill>
+              <a:latin typeface="Arial" panose="020B0604020202020204" pitchFamily="34" charset="0"/>
+              <a:cs typeface="Arial" panose="020B0604020202020204" pitchFamily="34" charset="0"/>
+            </a:endParaRPr>
+          </a:p>
+        </p:txBody>
+      </p:sp>
+      <p:sp>
+        <p:nvSpPr>
+          <p:cNvPr id="25" name="Rectangle: Rounded Corners 24">
+            <a:extLst>
+              <a:ext uri="{FF2B5EF4-FFF2-40B4-BE49-F238E27FC236}">
+                <a16:creationId xmlns:a16="http://schemas.microsoft.com/office/drawing/2014/main" id="{4722EBEF-5E54-226A-1D03-0F6070B1A74B}"/>
+              </a:ext>
+            </a:extLst>
+          </p:cNvPr>
+          <p:cNvSpPr/>
+          <p:nvPr userDrawn="1"/>
+        </p:nvSpPr>
+        <p:spPr>
+          <a:xfrm>
+            <a:off x="1978930" y="3394656"/>
+            <a:ext cx="1554480" cy="731520"/>
+          </a:xfrm>
+          <a:prstGeom prst="roundRect">
+            <a:avLst>
+              <a:gd name="adj" fmla="val 50000"/>
+            </a:avLst>
+          </a:prstGeom>
+          <a:solidFill>
+            <a:srgbClr val="D9D9D9">
+              <a:alpha val="50000"/>
+            </a:srgbClr>
+          </a:solidFill>
+          <a:ln>
+            <a:noFill/>
+          </a:ln>
+        </p:spPr>
+        <p:style>
+          <a:lnRef idx="2">
+            <a:schemeClr val="accent1">
+              <a:shade val="15000"/>
+            </a:schemeClr>
+          </a:lnRef>
+          <a:fillRef idx="1">
+            <a:schemeClr val="accent1"/>
+          </a:fillRef>
+          <a:effectRef idx="0">
+            <a:schemeClr val="accent1"/>
+          </a:effectRef>
+          <a:fontRef idx="minor">
+            <a:schemeClr val="lt1"/>
+          </a:fontRef>
+        </p:style>
+        <p:txBody>
+          <a:bodyPr rtlCol="0" anchor="t"/>
+          <a:lstStyle/>
+          <a:p>
+            <a:pPr algn="ctr"/>
+            <a:r>
+              <a:rPr lang="en-US" sz="800" b="1" dirty="0">
+                <a:solidFill>
+                  <a:schemeClr val="tx1"/>
+                </a:solidFill>
+                <a:latin typeface="Arial" panose="020B0604020202020204" pitchFamily="34" charset="0"/>
+                <a:cs typeface="Arial" panose="020B0604020202020204" pitchFamily="34" charset="0"/>
+              </a:rPr>
+              <a:t>LƯƠNG KINH DOANH</a:t>
+            </a:r>
+            <a:endParaRPr lang="en-AE" sz="800" b="1" dirty="0">
+              <a:solidFill>
+                <a:schemeClr val="tx1"/>
+              </a:solidFill>
+              <a:latin typeface="Arial" panose="020B0604020202020204" pitchFamily="34" charset="0"/>
+              <a:cs typeface="Arial" panose="020B0604020202020204" pitchFamily="34" charset="0"/>
+            </a:endParaRPr>
+          </a:p>
+        </p:txBody>
+      </p:sp>
+      <p:pic>
+        <p:nvPicPr>
+          <p:cNvPr id="29" name="Picture 28">
+            <a:extLst>
+              <a:ext uri="{FF2B5EF4-FFF2-40B4-BE49-F238E27FC236}">
+                <a16:creationId xmlns:a16="http://schemas.microsoft.com/office/drawing/2014/main" id="{B0CE3BCA-8409-6277-74AC-F1A33416BF27}"/>
+              </a:ext>
+            </a:extLst>
+          </p:cNvPr>
+          <p:cNvPicPr>
+            <a:picLocks noChangeAspect="1"/>
+          </p:cNvPicPr>
+          <p:nvPr userDrawn="1"/>
+        </p:nvPicPr>
+        <p:blipFill>
+          <a:blip r:embed="rId4"/>
+          <a:stretch>
+            <a:fillRect/>
+          </a:stretch>
+        </p:blipFill>
+        <p:spPr>
+          <a:xfrm>
+            <a:off x="336251" y="4291884"/>
+            <a:ext cx="3235004" cy="2071933"/>
+          </a:xfrm>
+          <a:prstGeom prst="rect">
+            <a:avLst/>
+          </a:prstGeom>
+        </p:spPr>
+      </p:pic>
+      <p:sp>
+        <p:nvSpPr>
+          <p:cNvPr id="30" name="Date Placeholder 3">
+            <a:extLst>
+              <a:ext uri="{FF2B5EF4-FFF2-40B4-BE49-F238E27FC236}">
+                <a16:creationId xmlns:a16="http://schemas.microsoft.com/office/drawing/2014/main" id="{DC0A2E8F-D5E3-E458-A03B-D6562F4FA169}"/>
+              </a:ext>
+            </a:extLst>
+          </p:cNvPr>
+          <p:cNvSpPr>
+            <a:spLocks noGrp="1"/>
+          </p:cNvSpPr>
+          <p:nvPr>
+            <p:ph type="dt" sz="half" idx="10"/>
+          </p:nvPr>
+        </p:nvSpPr>
+        <p:spPr>
+          <a:xfrm>
+            <a:off x="409211" y="335209"/>
+            <a:ext cx="4942014" cy="365125"/>
+          </a:xfrm>
+        </p:spPr>
+        <p:txBody>
+          <a:bodyPr/>
+          <a:lstStyle>
+            <a:lvl1pPr>
+              <a:defRPr sz="1600" b="1">
+                <a:solidFill>
+                  <a:schemeClr val="tx1"/>
+                </a:solidFill>
+                <a:latin typeface="Arial" panose="020B0604020202020204" pitchFamily="34" charset="0"/>
+                <a:cs typeface="Arial" panose="020B0604020202020204" pitchFamily="34" charset="0"/>
+              </a:defRPr>
+            </a:lvl1pPr>
+          </a:lstStyle>
+          <a:p>
+            <a:r>
+              <a:rPr lang="en-US" dirty="0"/>
+              <a:t>PERSONAL KPIs DASHBOARD</a:t>
+            </a:r>
+            <a:endParaRPr lang="en-AE" dirty="0"/>
+          </a:p>
+        </p:txBody>
+      </p:sp>
+      <p:pic>
+        <p:nvPicPr>
+          <p:cNvPr id="38" name="Picture 37" descr="A black background with a black square&#10;&#10;AI-generated content may be incorrect.">
+            <a:extLst>
+              <a:ext uri="{FF2B5EF4-FFF2-40B4-BE49-F238E27FC236}">
+                <a16:creationId xmlns:a16="http://schemas.microsoft.com/office/drawing/2014/main" id="{15588EC9-3D21-7B8F-106C-8A15D898D66E}"/>
+              </a:ext>
+            </a:extLst>
+          </p:cNvPr>
+          <p:cNvPicPr>
+            <a:picLocks noChangeAspect="1"/>
+          </p:cNvPicPr>
+          <p:nvPr userDrawn="1"/>
+        </p:nvPicPr>
+        <p:blipFill>
+          <a:blip r:embed="rId5">
+            <a:extLst>
+              <a:ext uri="{28A0092B-C50C-407E-A947-70E740481C1C}">
+                <a14:useLocalDpi xmlns:a14="http://schemas.microsoft.com/office/drawing/2010/main" val="0"/>
+              </a:ext>
+            </a:extLst>
+          </a:blip>
+          <a:stretch>
+            <a:fillRect/>
+          </a:stretch>
+        </p:blipFill>
+        <p:spPr>
+          <a:xfrm>
+            <a:off x="6965001" y="289171"/>
+            <a:ext cx="457200" cy="457200"/>
+          </a:xfrm>
+          <a:prstGeom prst="rect">
+            <a:avLst/>
+          </a:prstGeom>
+        </p:spPr>
+      </p:pic>
+      <p:sp>
+        <p:nvSpPr>
+          <p:cNvPr id="2" name="Date Placeholder 3">
+            <a:extLst>
+              <a:ext uri="{FF2B5EF4-FFF2-40B4-BE49-F238E27FC236}">
+                <a16:creationId xmlns:a16="http://schemas.microsoft.com/office/drawing/2014/main" id="{0EAE258B-4819-698D-766D-5ABB30797BD3}"/>
+              </a:ext>
+            </a:extLst>
+          </p:cNvPr>
+          <p:cNvSpPr txBox="1">
+            <a:spLocks/>
+          </p:cNvSpPr>
+          <p:nvPr userDrawn="1"/>
+        </p:nvSpPr>
+        <p:spPr>
+          <a:xfrm>
+            <a:off x="243840" y="6346226"/>
+            <a:ext cx="3365770" cy="365125"/>
+          </a:xfrm>
+          <a:prstGeom prst="rect">
+            <a:avLst/>
+          </a:prstGeom>
+        </p:spPr>
+        <p:txBody>
+          <a:bodyPr vert="horz" lIns="91440" tIns="45720" rIns="91440" bIns="45720" rtlCol="0" anchor="ctr"/>
+          <a:lstStyle>
+            <a:defPPr>
+              <a:defRPr lang="en-US"/>
+            </a:defPPr>
+            <a:lvl1pPr marL="0" algn="l" defTabSz="914400" rtl="0" eaLnBrk="1" latinLnBrk="0" hangingPunct="1">
+              <a:defRPr sz="1600" b="1" kern="1200">
+                <a:solidFill>
+                  <a:schemeClr val="tx1"/>
+                </a:solidFill>
+                <a:latin typeface="Arial" panose="020B0604020202020204" pitchFamily="34" charset="0"/>
+                <a:ea typeface="+mn-ea"/>
+                <a:cs typeface="Arial" panose="020B0604020202020204" pitchFamily="34" charset="0"/>
+              </a:defRPr>
+            </a:lvl1pPr>
+            <a:lvl2pPr marL="457200" algn="l" defTabSz="914400" rtl="0" eaLnBrk="1" latinLnBrk="0" hangingPunct="1">
+              <a:defRPr sz="1800" kern="1200">
+                <a:solidFill>
+                  <a:schemeClr val="tx1"/>
+                </a:solidFill>
+                <a:latin typeface="+mn-lt"/>
+                <a:ea typeface="+mn-ea"/>
+                <a:cs typeface="+mn-cs"/>
+              </a:defRPr>
+            </a:lvl2pPr>
+            <a:lvl3pPr marL="914400" algn="l" defTabSz="914400" rtl="0" eaLnBrk="1" latinLnBrk="0" hangingPunct="1">
+              <a:defRPr sz="1800" kern="1200">
+                <a:solidFill>
+                  <a:schemeClr val="tx1"/>
+                </a:solidFill>
+                <a:latin typeface="+mn-lt"/>
+                <a:ea typeface="+mn-ea"/>
+                <a:cs typeface="+mn-cs"/>
+              </a:defRPr>
+            </a:lvl3pPr>
+            <a:lvl4pPr marL="1371600" algn="l" defTabSz="914400" rtl="0" eaLnBrk="1" latinLnBrk="0" hangingPunct="1">
+              <a:defRPr sz="1800" kern="1200">
+                <a:solidFill>
+                  <a:schemeClr val="tx1"/>
+                </a:solidFill>
+                <a:latin typeface="+mn-lt"/>
+                <a:ea typeface="+mn-ea"/>
+                <a:cs typeface="+mn-cs"/>
+              </a:defRPr>
+            </a:lvl4pPr>
+            <a:lvl5pPr marL="1828800" algn="l" defTabSz="914400" rtl="0" eaLnBrk="1" latinLnBrk="0" hangingPunct="1">
+              <a:defRPr sz="1800" kern="1200">
+                <a:solidFill>
+                  <a:schemeClr val="tx1"/>
+                </a:solidFill>
+                <a:latin typeface="+mn-lt"/>
+                <a:ea typeface="+mn-ea"/>
+                <a:cs typeface="+mn-cs"/>
+              </a:defRPr>
+            </a:lvl5pPr>
+            <a:lvl6pPr marL="2286000" algn="l" defTabSz="914400" rtl="0" eaLnBrk="1" latinLnBrk="0" hangingPunct="1">
+              <a:defRPr sz="1800" kern="1200">
+                <a:solidFill>
+                  <a:schemeClr val="tx1"/>
+                </a:solidFill>
+                <a:latin typeface="+mn-lt"/>
+                <a:ea typeface="+mn-ea"/>
+                <a:cs typeface="+mn-cs"/>
+              </a:defRPr>
+            </a:lvl6pPr>
+            <a:lvl7pPr marL="2743200" algn="l" defTabSz="914400" rtl="0" eaLnBrk="1" latinLnBrk="0" hangingPunct="1">
+              <a:defRPr sz="1800" kern="1200">
+                <a:solidFill>
+                  <a:schemeClr val="tx1"/>
+                </a:solidFill>
+                <a:latin typeface="+mn-lt"/>
+                <a:ea typeface="+mn-ea"/>
+                <a:cs typeface="+mn-cs"/>
+              </a:defRPr>
+            </a:lvl7pPr>
+            <a:lvl8pPr marL="3200400" algn="l" defTabSz="914400" rtl="0" eaLnBrk="1" latinLnBrk="0" hangingPunct="1">
+              <a:defRPr sz="1800" kern="1200">
+                <a:solidFill>
+                  <a:schemeClr val="tx1"/>
+                </a:solidFill>
+                <a:latin typeface="+mn-lt"/>
+                <a:ea typeface="+mn-ea"/>
+                <a:cs typeface="+mn-cs"/>
+              </a:defRPr>
+            </a:lvl8pPr>
+            <a:lvl9pPr marL="3657600" algn="l" defTabSz="914400" rtl="0" eaLnBrk="1" latinLnBrk="0" hangingPunct="1">
+              <a:defRPr sz="1800" kern="1200">
+                <a:solidFill>
+                  <a:schemeClr val="tx1"/>
+                </a:solidFill>
+                <a:latin typeface="+mn-lt"/>
+                <a:ea typeface="+mn-ea"/>
+                <a:cs typeface="+mn-cs"/>
+              </a:defRPr>
+            </a:lvl9pPr>
+          </a:lstStyle>
+          <a:p>
+            <a:pPr algn="ctr"/>
+            <a:r>
+              <a:rPr lang="en-US" sz="1000" i="0" dirty="0">
+                <a:solidFill>
+                  <a:srgbClr val="BA3030"/>
+                </a:solidFill>
+              </a:rPr>
+              <a:t>⚠️</a:t>
+            </a:r>
+            <a:r>
+              <a:rPr lang="en-US" sz="1000" i="1" dirty="0">
+                <a:solidFill>
+                  <a:srgbClr val="BA3030"/>
+                </a:solidFill>
+              </a:rPr>
+              <a:t> Xem </a:t>
+            </a:r>
+            <a:r>
+              <a:rPr lang="en-US" sz="1000" i="1" dirty="0" err="1">
+                <a:solidFill>
+                  <a:srgbClr val="BA3030"/>
+                </a:solidFill>
+              </a:rPr>
+              <a:t>bảng</a:t>
+            </a:r>
+            <a:r>
+              <a:rPr lang="en-US" sz="1000" i="1" dirty="0">
+                <a:solidFill>
+                  <a:srgbClr val="BA3030"/>
+                </a:solidFill>
+              </a:rPr>
+              <a:t> </a:t>
+            </a:r>
+            <a:r>
+              <a:rPr lang="en-US" sz="1000" i="1" dirty="0" err="1">
+                <a:solidFill>
+                  <a:srgbClr val="BA3030"/>
+                </a:solidFill>
+              </a:rPr>
+              <a:t>quy</a:t>
+            </a:r>
+            <a:r>
+              <a:rPr lang="en-US" sz="1000" i="1" dirty="0">
+                <a:solidFill>
+                  <a:srgbClr val="BA3030"/>
+                </a:solidFill>
+              </a:rPr>
+              <a:t> </a:t>
+            </a:r>
+            <a:r>
+              <a:rPr lang="en-US" sz="1000" i="1" dirty="0" err="1">
+                <a:solidFill>
+                  <a:srgbClr val="BA3030"/>
+                </a:solidFill>
+              </a:rPr>
+              <a:t>đổi</a:t>
+            </a:r>
+            <a:r>
+              <a:rPr lang="en-US" sz="1000" i="1" dirty="0">
+                <a:solidFill>
+                  <a:srgbClr val="BA3030"/>
+                </a:solidFill>
+              </a:rPr>
+              <a:t> </a:t>
+            </a:r>
+            <a:r>
+              <a:rPr lang="en-US" sz="1000" i="1" dirty="0" err="1">
+                <a:solidFill>
+                  <a:srgbClr val="BA3030"/>
+                </a:solidFill>
+              </a:rPr>
+              <a:t>điểm</a:t>
+            </a:r>
+            <a:endParaRPr lang="en-AE" sz="1000" i="1" dirty="0">
+              <a:solidFill>
+                <a:srgbClr val="BA3030"/>
+              </a:solidFill>
+            </a:endParaRPr>
+          </a:p>
+        </p:txBody>
+      </p:sp>
+      <p:sp>
+        <p:nvSpPr>
+          <p:cNvPr id="5" name="Rectangle: Rounded Corners 4">
+            <a:extLst>
+              <a:ext uri="{FF2B5EF4-FFF2-40B4-BE49-F238E27FC236}">
+                <a16:creationId xmlns:a16="http://schemas.microsoft.com/office/drawing/2014/main" id="{F8860763-5C42-B3B7-0877-C8FEC325090E}"/>
+              </a:ext>
+            </a:extLst>
+          </p:cNvPr>
+          <p:cNvSpPr/>
+          <p:nvPr userDrawn="1"/>
+        </p:nvSpPr>
+        <p:spPr>
+          <a:xfrm>
+            <a:off x="3863008" y="5835535"/>
+            <a:ext cx="8085152" cy="870453"/>
+          </a:xfrm>
+          <a:prstGeom prst="roundRect">
+            <a:avLst>
+              <a:gd name="adj" fmla="val 14669"/>
+            </a:avLst>
+          </a:prstGeom>
+          <a:solidFill>
+            <a:schemeClr val="bg1"/>
+          </a:solidFill>
+          <a:ln>
+            <a:noFill/>
+          </a:ln>
+        </p:spPr>
+        <p:style>
+          <a:lnRef idx="2">
+            <a:schemeClr val="accent1">
+              <a:shade val="15000"/>
+            </a:schemeClr>
+          </a:lnRef>
+          <a:fillRef idx="1">
+            <a:schemeClr val="accent1"/>
+          </a:fillRef>
+          <a:effectRef idx="0">
+            <a:schemeClr val="accent1"/>
+          </a:effectRef>
+          <a:fontRef idx="minor">
+            <a:schemeClr val="lt1"/>
+          </a:fontRef>
+        </p:style>
+        <p:txBody>
+          <a:bodyPr rtlCol="0" anchor="ctr"/>
+          <a:lstStyle/>
+          <a:p>
+            <a:pPr algn="ctr"/>
+            <a:endParaRPr lang="en-AE" dirty="0"/>
+          </a:p>
+        </p:txBody>
+      </p:sp>
     </p:spTree>
     <p:extLst>
       <p:ext uri="{BB962C8B-B14F-4D97-AF65-F5344CB8AC3E}">
@@ -444,6 +1621,295 @@
 </file>
 
 <file path=ppt/slideLayouts/slideLayout10.xml><?xml version="1.0" encoding="utf-8"?>
+<p:sldLayout xmlns:a="http://schemas.openxmlformats.org/drawingml/2006/main" xmlns:r="http://schemas.openxmlformats.org/officeDocument/2006/relationships" xmlns:p="http://schemas.openxmlformats.org/presentationml/2006/main" type="picTx" preserve="1">
+  <p:cSld name="Picture with Caption">
+    <p:spTree>
+      <p:nvGrpSpPr>
+        <p:cNvPr id="1" name=""/>
+        <p:cNvGrpSpPr/>
+        <p:nvPr/>
+      </p:nvGrpSpPr>
+      <p:grpSpPr>
+        <a:xfrm>
+          <a:off x="0" y="0"/>
+          <a:ext cx="0" cy="0"/>
+          <a:chOff x="0" y="0"/>
+          <a:chExt cx="0" cy="0"/>
+        </a:xfrm>
+      </p:grpSpPr>
+      <p:sp>
+        <p:nvSpPr>
+          <p:cNvPr id="2" name="Title 1">
+            <a:extLst>
+              <a:ext uri="{FF2B5EF4-FFF2-40B4-BE49-F238E27FC236}">
+                <a16:creationId xmlns:a16="http://schemas.microsoft.com/office/drawing/2014/main" id="{ACD1451E-8AA9-B72A-F245-17E7A427F95E}"/>
+              </a:ext>
+            </a:extLst>
+          </p:cNvPr>
+          <p:cNvSpPr>
+            <a:spLocks noGrp="1"/>
+          </p:cNvSpPr>
+          <p:nvPr>
+            <p:ph type="title"/>
+          </p:nvPr>
+        </p:nvSpPr>
+        <p:spPr>
+          <a:xfrm>
+            <a:off x="839788" y="457200"/>
+            <a:ext cx="3932237" cy="1600200"/>
+          </a:xfrm>
+        </p:spPr>
+        <p:txBody>
+          <a:bodyPr anchor="b"/>
+          <a:lstStyle>
+            <a:lvl1pPr>
+              <a:defRPr sz="3200"/>
+            </a:lvl1pPr>
+          </a:lstStyle>
+          <a:p>
+            <a:r>
+              <a:rPr lang="en-US"/>
+              <a:t>Click to edit Master title style</a:t>
+            </a:r>
+            <a:endParaRPr lang="en-AE"/>
+          </a:p>
+        </p:txBody>
+      </p:sp>
+      <p:sp>
+        <p:nvSpPr>
+          <p:cNvPr id="3" name="Picture Placeholder 2">
+            <a:extLst>
+              <a:ext uri="{FF2B5EF4-FFF2-40B4-BE49-F238E27FC236}">
+                <a16:creationId xmlns:a16="http://schemas.microsoft.com/office/drawing/2014/main" id="{0452F916-18CE-E064-E21D-EC26024B0F7E}"/>
+              </a:ext>
+            </a:extLst>
+          </p:cNvPr>
+          <p:cNvSpPr>
+            <a:spLocks noGrp="1"/>
+          </p:cNvSpPr>
+          <p:nvPr>
+            <p:ph type="pic" idx="1"/>
+          </p:nvPr>
+        </p:nvSpPr>
+        <p:spPr>
+          <a:xfrm>
+            <a:off x="5183188" y="987425"/>
+            <a:ext cx="6172200" cy="4873625"/>
+          </a:xfrm>
+        </p:spPr>
+        <p:txBody>
+          <a:bodyPr/>
+          <a:lstStyle>
+            <a:lvl1pPr marL="0" indent="0">
+              <a:buNone/>
+              <a:defRPr sz="3200"/>
+            </a:lvl1pPr>
+            <a:lvl2pPr marL="457200" indent="0">
+              <a:buNone/>
+              <a:defRPr sz="2800"/>
+            </a:lvl2pPr>
+            <a:lvl3pPr marL="914400" indent="0">
+              <a:buNone/>
+              <a:defRPr sz="2400"/>
+            </a:lvl3pPr>
+            <a:lvl4pPr marL="1371600" indent="0">
+              <a:buNone/>
+              <a:defRPr sz="2000"/>
+            </a:lvl4pPr>
+            <a:lvl5pPr marL="1828800" indent="0">
+              <a:buNone/>
+              <a:defRPr sz="2000"/>
+            </a:lvl5pPr>
+            <a:lvl6pPr marL="2286000" indent="0">
+              <a:buNone/>
+              <a:defRPr sz="2000"/>
+            </a:lvl6pPr>
+            <a:lvl7pPr marL="2743200" indent="0">
+              <a:buNone/>
+              <a:defRPr sz="2000"/>
+            </a:lvl7pPr>
+            <a:lvl8pPr marL="3200400" indent="0">
+              <a:buNone/>
+              <a:defRPr sz="2000"/>
+            </a:lvl8pPr>
+            <a:lvl9pPr marL="3657600" indent="0">
+              <a:buNone/>
+              <a:defRPr sz="2000"/>
+            </a:lvl9pPr>
+          </a:lstStyle>
+          <a:p>
+            <a:endParaRPr lang="en-AE"/>
+          </a:p>
+        </p:txBody>
+      </p:sp>
+      <p:sp>
+        <p:nvSpPr>
+          <p:cNvPr id="4" name="Text Placeholder 3">
+            <a:extLst>
+              <a:ext uri="{FF2B5EF4-FFF2-40B4-BE49-F238E27FC236}">
+                <a16:creationId xmlns:a16="http://schemas.microsoft.com/office/drawing/2014/main" id="{823E7212-F9CD-02C4-2E52-6EAB9274C2B3}"/>
+              </a:ext>
+            </a:extLst>
+          </p:cNvPr>
+          <p:cNvSpPr>
+            <a:spLocks noGrp="1"/>
+          </p:cNvSpPr>
+          <p:nvPr>
+            <p:ph type="body" sz="half" idx="2"/>
+          </p:nvPr>
+        </p:nvSpPr>
+        <p:spPr>
+          <a:xfrm>
+            <a:off x="839788" y="2057400"/>
+            <a:ext cx="3932237" cy="3811588"/>
+          </a:xfrm>
+        </p:spPr>
+        <p:txBody>
+          <a:bodyPr/>
+          <a:lstStyle>
+            <a:lvl1pPr marL="0" indent="0">
+              <a:buNone/>
+              <a:defRPr sz="1600"/>
+            </a:lvl1pPr>
+            <a:lvl2pPr marL="457200" indent="0">
+              <a:buNone/>
+              <a:defRPr sz="1400"/>
+            </a:lvl2pPr>
+            <a:lvl3pPr marL="914400" indent="0">
+              <a:buNone/>
+              <a:defRPr sz="1200"/>
+            </a:lvl3pPr>
+            <a:lvl4pPr marL="1371600" indent="0">
+              <a:buNone/>
+              <a:defRPr sz="1000"/>
+            </a:lvl4pPr>
+            <a:lvl5pPr marL="1828800" indent="0">
+              <a:buNone/>
+              <a:defRPr sz="1000"/>
+            </a:lvl5pPr>
+            <a:lvl6pPr marL="2286000" indent="0">
+              <a:buNone/>
+              <a:defRPr sz="1000"/>
+            </a:lvl6pPr>
+            <a:lvl7pPr marL="2743200" indent="0">
+              <a:buNone/>
+              <a:defRPr sz="1000"/>
+            </a:lvl7pPr>
+            <a:lvl8pPr marL="3200400" indent="0">
+              <a:buNone/>
+              <a:defRPr sz="1000"/>
+            </a:lvl8pPr>
+            <a:lvl9pPr marL="3657600" indent="0">
+              <a:buNone/>
+              <a:defRPr sz="1000"/>
+            </a:lvl9pPr>
+          </a:lstStyle>
+          <a:p>
+            <a:pPr lvl="0"/>
+            <a:r>
+              <a:rPr lang="en-US"/>
+              <a:t>Click to edit Master text styles</a:t>
+            </a:r>
+          </a:p>
+        </p:txBody>
+      </p:sp>
+      <p:sp>
+        <p:nvSpPr>
+          <p:cNvPr id="5" name="Date Placeholder 4">
+            <a:extLst>
+              <a:ext uri="{FF2B5EF4-FFF2-40B4-BE49-F238E27FC236}">
+                <a16:creationId xmlns:a16="http://schemas.microsoft.com/office/drawing/2014/main" id="{71EFA156-E3A1-55D2-E947-E39F13DF0432}"/>
+              </a:ext>
+            </a:extLst>
+          </p:cNvPr>
+          <p:cNvSpPr>
+            <a:spLocks noGrp="1"/>
+          </p:cNvSpPr>
+          <p:nvPr>
+            <p:ph type="dt" sz="half" idx="10"/>
+          </p:nvPr>
+        </p:nvSpPr>
+        <p:spPr/>
+        <p:txBody>
+          <a:bodyPr/>
+          <a:lstStyle/>
+          <a:p>
+            <a:fld id="{D66564CD-D043-413E-A3F3-6D8F6E5015DC}" type="datetimeFigureOut">
+              <a:rPr lang="en-AE" smtClean="0"/>
+              <a:t>28/10/2025</a:t>
+            </a:fld>
+            <a:endParaRPr lang="en-AE"/>
+          </a:p>
+        </p:txBody>
+      </p:sp>
+      <p:sp>
+        <p:nvSpPr>
+          <p:cNvPr id="6" name="Footer Placeholder 5">
+            <a:extLst>
+              <a:ext uri="{FF2B5EF4-FFF2-40B4-BE49-F238E27FC236}">
+                <a16:creationId xmlns:a16="http://schemas.microsoft.com/office/drawing/2014/main" id="{04C833BD-43FD-3AED-A5B1-497AD2E1372E}"/>
+              </a:ext>
+            </a:extLst>
+          </p:cNvPr>
+          <p:cNvSpPr>
+            <a:spLocks noGrp="1"/>
+          </p:cNvSpPr>
+          <p:nvPr>
+            <p:ph type="ftr" sz="quarter" idx="11"/>
+          </p:nvPr>
+        </p:nvSpPr>
+        <p:spPr/>
+        <p:txBody>
+          <a:bodyPr/>
+          <a:lstStyle/>
+          <a:p>
+            <a:endParaRPr lang="en-AE"/>
+          </a:p>
+        </p:txBody>
+      </p:sp>
+      <p:sp>
+        <p:nvSpPr>
+          <p:cNvPr id="7" name="Slide Number Placeholder 6">
+            <a:extLst>
+              <a:ext uri="{FF2B5EF4-FFF2-40B4-BE49-F238E27FC236}">
+                <a16:creationId xmlns:a16="http://schemas.microsoft.com/office/drawing/2014/main" id="{9833B89C-D38C-91F3-A418-E9333C584B5E}"/>
+              </a:ext>
+            </a:extLst>
+          </p:cNvPr>
+          <p:cNvSpPr>
+            <a:spLocks noGrp="1"/>
+          </p:cNvSpPr>
+          <p:nvPr>
+            <p:ph type="sldNum" sz="quarter" idx="12"/>
+          </p:nvPr>
+        </p:nvSpPr>
+        <p:spPr/>
+        <p:txBody>
+          <a:bodyPr/>
+          <a:lstStyle/>
+          <a:p>
+            <a:fld id="{07175E78-BEE4-4AAB-93F0-CD7B33C308AB}" type="slidenum">
+              <a:rPr lang="en-AE" smtClean="0"/>
+              <a:t>‹#›</a:t>
+            </a:fld>
+            <a:endParaRPr lang="en-AE"/>
+          </a:p>
+        </p:txBody>
+      </p:sp>
+    </p:spTree>
+    <p:extLst>
+      <p:ext uri="{BB962C8B-B14F-4D97-AF65-F5344CB8AC3E}">
+        <p14:creationId xmlns:p14="http://schemas.microsoft.com/office/powerpoint/2010/main" val="1891507514"/>
+      </p:ext>
+    </p:extLst>
+  </p:cSld>
+  <p:clrMapOvr>
+    <a:masterClrMapping/>
+  </p:clrMapOvr>
+</p:sldLayout>
+</file>
+
+<file path=ppt/slideLayouts/slideLayout11.xml><?xml version="1.0" encoding="utf-8"?>
 <p:sldLayout xmlns:a="http://schemas.openxmlformats.org/drawingml/2006/main" xmlns:r="http://schemas.openxmlformats.org/officeDocument/2006/relationships" xmlns:p="http://schemas.openxmlformats.org/presentationml/2006/main" type="vertTx" preserve="1">
   <p:cSld name="Title and Vertical Text">
     <p:spTree>
@@ -570,7 +2036,7 @@
           <a:p>
             <a:fld id="{D66564CD-D043-413E-A3F3-6D8F6E5015DC}" type="datetimeFigureOut">
               <a:rPr lang="en-AE" smtClean="0"/>
-              <a:t>20/10/2025</a:t>
+              <a:t>28/10/2025</a:t>
             </a:fld>
             <a:endParaRPr lang="en-AE"/>
           </a:p>
@@ -643,7 +2109,7 @@
 </p:sldLayout>
 </file>
 
-<file path=ppt/slideLayouts/slideLayout11.xml><?xml version="1.0" encoding="utf-8"?>
+<file path=ppt/slideLayouts/slideLayout12.xml><?xml version="1.0" encoding="utf-8"?>
 <p:sldLayout xmlns:a="http://schemas.openxmlformats.org/drawingml/2006/main" xmlns:r="http://schemas.openxmlformats.org/officeDocument/2006/relationships" xmlns:p="http://schemas.openxmlformats.org/presentationml/2006/main" type="vertTitleAndTx" preserve="1">
   <p:cSld name="Vertical Title and Text">
     <p:spTree>
@@ -780,7 +2246,7 @@
           <a:p>
             <a:fld id="{D66564CD-D043-413E-A3F3-6D8F6E5015DC}" type="datetimeFigureOut">
               <a:rPr lang="en-AE" smtClean="0"/>
-              <a:t>20/10/2025</a:t>
+              <a:t>28/10/2025</a:t>
             </a:fld>
             <a:endParaRPr lang="en-AE"/>
           </a:p>
@@ -854,6 +2320,1247 @@
 </file>
 
 <file path=ppt/slideLayouts/slideLayout2.xml><?xml version="1.0" encoding="utf-8"?>
+<p:sldLayout xmlns:a="http://schemas.openxmlformats.org/drawingml/2006/main" xmlns:r="http://schemas.openxmlformats.org/officeDocument/2006/relationships" xmlns:p="http://schemas.openxmlformats.org/presentationml/2006/main" preserve="1" userDrawn="1">
+  <p:cSld name="1_Title Slide">
+    <p:bg>
+      <p:bgPr>
+        <a:solidFill>
+          <a:schemeClr val="bg1">
+            <a:lumMod val="85000"/>
+            <a:alpha val="50000"/>
+          </a:schemeClr>
+        </a:solidFill>
+        <a:effectLst/>
+      </p:bgPr>
+    </p:bg>
+    <p:spTree>
+      <p:nvGrpSpPr>
+        <p:cNvPr id="1" name=""/>
+        <p:cNvGrpSpPr/>
+        <p:nvPr/>
+      </p:nvGrpSpPr>
+      <p:grpSpPr>
+        <a:xfrm>
+          <a:off x="0" y="0"/>
+          <a:ext cx="0" cy="0"/>
+          <a:chOff x="0" y="0"/>
+          <a:chExt cx="0" cy="0"/>
+        </a:xfrm>
+      </p:grpSpPr>
+      <p:sp>
+        <p:nvSpPr>
+          <p:cNvPr id="7" name="Rectangle: Rounded Corners 6">
+            <a:extLst>
+              <a:ext uri="{FF2B5EF4-FFF2-40B4-BE49-F238E27FC236}">
+                <a16:creationId xmlns:a16="http://schemas.microsoft.com/office/drawing/2014/main" id="{E8B7742C-B45D-B243-3D99-728E9EFD828D}"/>
+              </a:ext>
+            </a:extLst>
+          </p:cNvPr>
+          <p:cNvSpPr/>
+          <p:nvPr userDrawn="1"/>
+        </p:nvSpPr>
+        <p:spPr>
+          <a:xfrm>
+            <a:off x="243840" y="152012"/>
+            <a:ext cx="11704320" cy="731520"/>
+          </a:xfrm>
+          <a:prstGeom prst="roundRect">
+            <a:avLst>
+              <a:gd name="adj" fmla="val 50000"/>
+            </a:avLst>
+          </a:prstGeom>
+          <a:solidFill>
+            <a:schemeClr val="bg1"/>
+          </a:solidFill>
+          <a:ln>
+            <a:noFill/>
+          </a:ln>
+        </p:spPr>
+        <p:style>
+          <a:lnRef idx="2">
+            <a:schemeClr val="accent1">
+              <a:shade val="15000"/>
+            </a:schemeClr>
+          </a:lnRef>
+          <a:fillRef idx="1">
+            <a:schemeClr val="accent1"/>
+          </a:fillRef>
+          <a:effectRef idx="0">
+            <a:schemeClr val="accent1"/>
+          </a:effectRef>
+          <a:fontRef idx="minor">
+            <a:schemeClr val="lt1"/>
+          </a:fontRef>
+        </p:style>
+        <p:txBody>
+          <a:bodyPr rtlCol="0" anchor="ctr"/>
+          <a:lstStyle/>
+          <a:p>
+            <a:pPr algn="ctr"/>
+            <a:endParaRPr lang="en-AE"/>
+          </a:p>
+        </p:txBody>
+      </p:sp>
+      <p:sp>
+        <p:nvSpPr>
+          <p:cNvPr id="8" name="Rectangle: Rounded Corners 7">
+            <a:extLst>
+              <a:ext uri="{FF2B5EF4-FFF2-40B4-BE49-F238E27FC236}">
+                <a16:creationId xmlns:a16="http://schemas.microsoft.com/office/drawing/2014/main" id="{DC396AAF-C03D-E1FD-9E75-CB7A45D732A2}"/>
+              </a:ext>
+            </a:extLst>
+          </p:cNvPr>
+          <p:cNvSpPr/>
+          <p:nvPr userDrawn="1"/>
+        </p:nvSpPr>
+        <p:spPr>
+          <a:xfrm>
+            <a:off x="6840778" y="243452"/>
+            <a:ext cx="4978327" cy="548640"/>
+          </a:xfrm>
+          <a:prstGeom prst="roundRect">
+            <a:avLst>
+              <a:gd name="adj" fmla="val 50000"/>
+            </a:avLst>
+          </a:prstGeom>
+          <a:solidFill>
+            <a:srgbClr val="D9D9D9">
+              <a:alpha val="50000"/>
+            </a:srgbClr>
+          </a:solidFill>
+          <a:ln>
+            <a:noFill/>
+          </a:ln>
+        </p:spPr>
+        <p:style>
+          <a:lnRef idx="2">
+            <a:schemeClr val="accent1">
+              <a:shade val="15000"/>
+            </a:schemeClr>
+          </a:lnRef>
+          <a:fillRef idx="1">
+            <a:schemeClr val="accent1"/>
+          </a:fillRef>
+          <a:effectRef idx="0">
+            <a:schemeClr val="accent1"/>
+          </a:effectRef>
+          <a:fontRef idx="minor">
+            <a:schemeClr val="lt1"/>
+          </a:fontRef>
+        </p:style>
+        <p:txBody>
+          <a:bodyPr rtlCol="0" anchor="ctr"/>
+          <a:lstStyle/>
+          <a:p>
+            <a:pPr algn="ctr"/>
+            <a:endParaRPr lang="en-AE"/>
+          </a:p>
+        </p:txBody>
+      </p:sp>
+      <p:grpSp>
+        <p:nvGrpSpPr>
+          <p:cNvPr id="19" name="Group 18">
+            <a:extLst>
+              <a:ext uri="{FF2B5EF4-FFF2-40B4-BE49-F238E27FC236}">
+                <a16:creationId xmlns:a16="http://schemas.microsoft.com/office/drawing/2014/main" id="{088894E0-D181-FAB3-06C7-E18045BB4B31}"/>
+              </a:ext>
+            </a:extLst>
+          </p:cNvPr>
+          <p:cNvGrpSpPr/>
+          <p:nvPr userDrawn="1"/>
+        </p:nvGrpSpPr>
+        <p:grpSpPr>
+          <a:xfrm>
+            <a:off x="243840" y="1073260"/>
+            <a:ext cx="3365770" cy="1188720"/>
+            <a:chOff x="243840" y="1073260"/>
+            <a:chExt cx="3365770" cy="1188720"/>
+          </a:xfrm>
+        </p:grpSpPr>
+        <p:sp>
+          <p:nvSpPr>
+            <p:cNvPr id="13" name="Rectangle: Rounded Corners 12">
+              <a:extLst>
+                <a:ext uri="{FF2B5EF4-FFF2-40B4-BE49-F238E27FC236}">
+                  <a16:creationId xmlns:a16="http://schemas.microsoft.com/office/drawing/2014/main" id="{80FDD49E-C3A7-E454-7687-704F9EC2BB2E}"/>
+                </a:ext>
+              </a:extLst>
+            </p:cNvPr>
+            <p:cNvSpPr/>
+            <p:nvPr userDrawn="1"/>
+          </p:nvSpPr>
+          <p:spPr>
+            <a:xfrm>
+              <a:off x="409210" y="1118980"/>
+              <a:ext cx="3200400" cy="1097280"/>
+            </a:xfrm>
+            <a:prstGeom prst="roundRect">
+              <a:avLst>
+                <a:gd name="adj" fmla="val 50000"/>
+              </a:avLst>
+            </a:prstGeom>
+            <a:solidFill>
+              <a:schemeClr val="bg1"/>
+            </a:solidFill>
+            <a:ln>
+              <a:noFill/>
+            </a:ln>
+          </p:spPr>
+          <p:style>
+            <a:lnRef idx="2">
+              <a:schemeClr val="accent1">
+                <a:shade val="15000"/>
+              </a:schemeClr>
+            </a:lnRef>
+            <a:fillRef idx="1">
+              <a:schemeClr val="accent1"/>
+            </a:fillRef>
+            <a:effectRef idx="0">
+              <a:schemeClr val="accent1"/>
+            </a:effectRef>
+            <a:fontRef idx="minor">
+              <a:schemeClr val="lt1"/>
+            </a:fontRef>
+          </p:style>
+          <p:txBody>
+            <a:bodyPr rtlCol="0" anchor="ctr"/>
+            <a:lstStyle/>
+            <a:p>
+              <a:pPr algn="ctr"/>
+              <a:endParaRPr lang="en-AE" dirty="0"/>
+            </a:p>
+          </p:txBody>
+        </p:sp>
+        <p:sp>
+          <p:nvSpPr>
+            <p:cNvPr id="17" name="Rectangle: Rounded Corners 16">
+              <a:extLst>
+                <a:ext uri="{FF2B5EF4-FFF2-40B4-BE49-F238E27FC236}">
+                  <a16:creationId xmlns:a16="http://schemas.microsoft.com/office/drawing/2014/main" id="{F58D2557-F495-5D28-B72C-B56724A4BC5E}"/>
+                </a:ext>
+              </a:extLst>
+            </p:cNvPr>
+            <p:cNvSpPr/>
+            <p:nvPr userDrawn="1"/>
+          </p:nvSpPr>
+          <p:spPr>
+            <a:xfrm>
+              <a:off x="243840" y="1073260"/>
+              <a:ext cx="1188720" cy="1188720"/>
+            </a:xfrm>
+            <a:prstGeom prst="roundRect">
+              <a:avLst>
+                <a:gd name="adj" fmla="val 50000"/>
+              </a:avLst>
+            </a:prstGeom>
+            <a:gradFill flip="none" rotWithShape="1">
+              <a:gsLst>
+                <a:gs pos="0">
+                  <a:srgbClr val="00B0F0"/>
+                </a:gs>
+                <a:gs pos="49000">
+                  <a:schemeClr val="tx2">
+                    <a:lumMod val="75000"/>
+                    <a:lumOff val="25000"/>
+                  </a:schemeClr>
+                </a:gs>
+                <a:gs pos="79000">
+                  <a:schemeClr val="accent1">
+                    <a:lumMod val="50000"/>
+                  </a:schemeClr>
+                </a:gs>
+              </a:gsLst>
+              <a:path path="circle">
+                <a:fillToRect t="100000" r="100000"/>
+              </a:path>
+              <a:tileRect l="-100000" b="-100000"/>
+            </a:gradFill>
+            <a:ln>
+              <a:noFill/>
+            </a:ln>
+          </p:spPr>
+          <p:style>
+            <a:lnRef idx="2">
+              <a:schemeClr val="accent1">
+                <a:shade val="15000"/>
+              </a:schemeClr>
+            </a:lnRef>
+            <a:fillRef idx="1">
+              <a:schemeClr val="accent1"/>
+            </a:fillRef>
+            <a:effectRef idx="0">
+              <a:schemeClr val="accent1"/>
+            </a:effectRef>
+            <a:fontRef idx="minor">
+              <a:schemeClr val="lt1"/>
+            </a:fontRef>
+          </p:style>
+          <p:txBody>
+            <a:bodyPr rtlCol="0" anchor="ctr"/>
+            <a:lstStyle/>
+            <a:p>
+              <a:pPr algn="ctr"/>
+              <a:endParaRPr lang="en-AE"/>
+            </a:p>
+          </p:txBody>
+        </p:sp>
+      </p:grpSp>
+      <p:pic>
+        <p:nvPicPr>
+          <p:cNvPr id="3" name="Graphic 2" descr="User with solid fill">
+            <a:extLst>
+              <a:ext uri="{FF2B5EF4-FFF2-40B4-BE49-F238E27FC236}">
+                <a16:creationId xmlns:a16="http://schemas.microsoft.com/office/drawing/2014/main" id="{4BA596C4-0A83-2913-C253-B71D81F8EA2D}"/>
+              </a:ext>
+            </a:extLst>
+          </p:cNvPr>
+          <p:cNvPicPr>
+            <a:picLocks noChangeAspect="1"/>
+          </p:cNvPicPr>
+          <p:nvPr userDrawn="1"/>
+        </p:nvPicPr>
+        <p:blipFill>
+          <a:blip r:embed="rId2">
+            <a:extLst>
+              <a:ext uri="{96DAC541-7B7A-43D3-8B79-37D633B846F1}">
+                <asvg:svgBlip xmlns:asvg="http://schemas.microsoft.com/office/drawing/2016/SVG/main" r:embed="rId3"/>
+              </a:ext>
+            </a:extLst>
+          </a:blip>
+          <a:stretch>
+            <a:fillRect/>
+          </a:stretch>
+        </p:blipFill>
+        <p:spPr>
+          <a:xfrm>
+            <a:off x="381000" y="1210420"/>
+            <a:ext cx="914400" cy="914400"/>
+          </a:xfrm>
+          <a:prstGeom prst="rect">
+            <a:avLst/>
+          </a:prstGeom>
+        </p:spPr>
+      </p:pic>
+      <p:sp>
+        <p:nvSpPr>
+          <p:cNvPr id="4" name="Rectangle: Rounded Corners 3">
+            <a:extLst>
+              <a:ext uri="{FF2B5EF4-FFF2-40B4-BE49-F238E27FC236}">
+                <a16:creationId xmlns:a16="http://schemas.microsoft.com/office/drawing/2014/main" id="{7C234525-0A28-2DEA-9D3F-42F7ECDFCCAE}"/>
+              </a:ext>
+            </a:extLst>
+          </p:cNvPr>
+          <p:cNvSpPr/>
+          <p:nvPr userDrawn="1"/>
+        </p:nvSpPr>
+        <p:spPr>
+          <a:xfrm>
+            <a:off x="243840" y="2331720"/>
+            <a:ext cx="3365770" cy="4374268"/>
+          </a:xfrm>
+          <a:prstGeom prst="roundRect">
+            <a:avLst>
+              <a:gd name="adj" fmla="val 4164"/>
+            </a:avLst>
+          </a:prstGeom>
+          <a:solidFill>
+            <a:schemeClr val="bg1"/>
+          </a:solidFill>
+          <a:ln>
+            <a:noFill/>
+          </a:ln>
+        </p:spPr>
+        <p:style>
+          <a:lnRef idx="2">
+            <a:schemeClr val="accent1">
+              <a:shade val="15000"/>
+            </a:schemeClr>
+          </a:lnRef>
+          <a:fillRef idx="1">
+            <a:schemeClr val="accent1"/>
+          </a:fillRef>
+          <a:effectRef idx="0">
+            <a:schemeClr val="accent1"/>
+          </a:effectRef>
+          <a:fontRef idx="minor">
+            <a:schemeClr val="lt1"/>
+          </a:fontRef>
+        </p:style>
+        <p:txBody>
+          <a:bodyPr rtlCol="0" anchor="ctr"/>
+          <a:lstStyle/>
+          <a:p>
+            <a:pPr algn="ctr"/>
+            <a:endParaRPr lang="en-AE" dirty="0"/>
+          </a:p>
+        </p:txBody>
+      </p:sp>
+      <p:sp>
+        <p:nvSpPr>
+          <p:cNvPr id="6" name="Rectangle: Rounded Corners 5">
+            <a:extLst>
+              <a:ext uri="{FF2B5EF4-FFF2-40B4-BE49-F238E27FC236}">
+                <a16:creationId xmlns:a16="http://schemas.microsoft.com/office/drawing/2014/main" id="{7381B74B-398A-23DC-21A7-22881706FD00}"/>
+              </a:ext>
+            </a:extLst>
+          </p:cNvPr>
+          <p:cNvSpPr/>
+          <p:nvPr userDrawn="1"/>
+        </p:nvSpPr>
+        <p:spPr>
+          <a:xfrm>
+            <a:off x="3863008" y="1118979"/>
+            <a:ext cx="8085152" cy="2641034"/>
+          </a:xfrm>
+          <a:prstGeom prst="roundRect">
+            <a:avLst>
+              <a:gd name="adj" fmla="val 5243"/>
+            </a:avLst>
+          </a:prstGeom>
+          <a:solidFill>
+            <a:schemeClr val="bg1"/>
+          </a:solidFill>
+          <a:ln>
+            <a:noFill/>
+          </a:ln>
+        </p:spPr>
+        <p:style>
+          <a:lnRef idx="2">
+            <a:schemeClr val="accent1">
+              <a:shade val="15000"/>
+            </a:schemeClr>
+          </a:lnRef>
+          <a:fillRef idx="1">
+            <a:schemeClr val="accent1"/>
+          </a:fillRef>
+          <a:effectRef idx="0">
+            <a:schemeClr val="accent1"/>
+          </a:effectRef>
+          <a:fontRef idx="minor">
+            <a:schemeClr val="lt1"/>
+          </a:fontRef>
+        </p:style>
+        <p:txBody>
+          <a:bodyPr rtlCol="0" anchor="ctr"/>
+          <a:lstStyle/>
+          <a:p>
+            <a:pPr algn="ctr"/>
+            <a:endParaRPr lang="en-AE" dirty="0"/>
+          </a:p>
+        </p:txBody>
+      </p:sp>
+      <p:sp>
+        <p:nvSpPr>
+          <p:cNvPr id="9" name="Rectangle: Rounded Corners 8">
+            <a:extLst>
+              <a:ext uri="{FF2B5EF4-FFF2-40B4-BE49-F238E27FC236}">
+                <a16:creationId xmlns:a16="http://schemas.microsoft.com/office/drawing/2014/main" id="{DA9803B7-FD84-EE62-F93A-3B853902451D}"/>
+              </a:ext>
+            </a:extLst>
+          </p:cNvPr>
+          <p:cNvSpPr/>
+          <p:nvPr userDrawn="1"/>
+        </p:nvSpPr>
+        <p:spPr>
+          <a:xfrm>
+            <a:off x="3863008" y="3906981"/>
+            <a:ext cx="8085152" cy="2804049"/>
+          </a:xfrm>
+          <a:prstGeom prst="roundRect">
+            <a:avLst>
+              <a:gd name="adj" fmla="val 4455"/>
+            </a:avLst>
+          </a:prstGeom>
+          <a:solidFill>
+            <a:schemeClr val="bg1"/>
+          </a:solidFill>
+          <a:ln>
+            <a:noFill/>
+          </a:ln>
+        </p:spPr>
+        <p:style>
+          <a:lnRef idx="2">
+            <a:schemeClr val="accent1">
+              <a:shade val="15000"/>
+            </a:schemeClr>
+          </a:lnRef>
+          <a:fillRef idx="1">
+            <a:schemeClr val="accent1"/>
+          </a:fillRef>
+          <a:effectRef idx="0">
+            <a:schemeClr val="accent1"/>
+          </a:effectRef>
+          <a:fontRef idx="minor">
+            <a:schemeClr val="lt1"/>
+          </a:fontRef>
+        </p:style>
+        <p:txBody>
+          <a:bodyPr rtlCol="0" anchor="ctr"/>
+          <a:lstStyle/>
+          <a:p>
+            <a:pPr algn="ctr"/>
+            <a:endParaRPr lang="en-AE" dirty="0"/>
+          </a:p>
+        </p:txBody>
+      </p:sp>
+      <p:sp>
+        <p:nvSpPr>
+          <p:cNvPr id="11" name="Rectangle: Rounded Corners 10">
+            <a:extLst>
+              <a:ext uri="{FF2B5EF4-FFF2-40B4-BE49-F238E27FC236}">
+                <a16:creationId xmlns:a16="http://schemas.microsoft.com/office/drawing/2014/main" id="{57F177CD-4051-0762-4ED1-DBAC044376EA}"/>
+              </a:ext>
+            </a:extLst>
+          </p:cNvPr>
+          <p:cNvSpPr/>
+          <p:nvPr userDrawn="1"/>
+        </p:nvSpPr>
+        <p:spPr>
+          <a:xfrm>
+            <a:off x="345600" y="2497428"/>
+            <a:ext cx="1554480" cy="731520"/>
+          </a:xfrm>
+          <a:prstGeom prst="roundRect">
+            <a:avLst>
+              <a:gd name="adj" fmla="val 50000"/>
+            </a:avLst>
+          </a:prstGeom>
+          <a:solidFill>
+            <a:srgbClr val="D9D9D9">
+              <a:alpha val="50000"/>
+            </a:srgbClr>
+          </a:solidFill>
+          <a:ln>
+            <a:noFill/>
+          </a:ln>
+        </p:spPr>
+        <p:style>
+          <a:lnRef idx="2">
+            <a:schemeClr val="accent1">
+              <a:shade val="15000"/>
+            </a:schemeClr>
+          </a:lnRef>
+          <a:fillRef idx="1">
+            <a:schemeClr val="accent1"/>
+          </a:fillRef>
+          <a:effectRef idx="0">
+            <a:schemeClr val="accent1"/>
+          </a:effectRef>
+          <a:fontRef idx="minor">
+            <a:schemeClr val="lt1"/>
+          </a:fontRef>
+        </p:style>
+        <p:txBody>
+          <a:bodyPr rtlCol="0" anchor="t"/>
+          <a:lstStyle/>
+          <a:p>
+            <a:pPr algn="ctr"/>
+            <a:r>
+              <a:rPr lang="en-US" sz="1000" b="1" dirty="0">
+                <a:solidFill>
+                  <a:schemeClr val="tx1"/>
+                </a:solidFill>
+                <a:latin typeface="Arial" panose="020B0604020202020204" pitchFamily="34" charset="0"/>
+                <a:cs typeface="Arial" panose="020B0604020202020204" pitchFamily="34" charset="0"/>
+              </a:rPr>
+              <a:t>ĐIỂM TH CÁ NHÂN</a:t>
+            </a:r>
+            <a:endParaRPr lang="en-AE" sz="1000" b="1" dirty="0">
+              <a:solidFill>
+                <a:schemeClr val="tx1"/>
+              </a:solidFill>
+              <a:latin typeface="Arial" panose="020B0604020202020204" pitchFamily="34" charset="0"/>
+              <a:cs typeface="Arial" panose="020B0604020202020204" pitchFamily="34" charset="0"/>
+            </a:endParaRPr>
+          </a:p>
+        </p:txBody>
+      </p:sp>
+      <p:sp>
+        <p:nvSpPr>
+          <p:cNvPr id="23" name="Rectangle: Rounded Corners 22">
+            <a:extLst>
+              <a:ext uri="{FF2B5EF4-FFF2-40B4-BE49-F238E27FC236}">
+                <a16:creationId xmlns:a16="http://schemas.microsoft.com/office/drawing/2014/main" id="{A2B9992C-97E2-0DD8-F153-895941905959}"/>
+              </a:ext>
+            </a:extLst>
+          </p:cNvPr>
+          <p:cNvSpPr/>
+          <p:nvPr userDrawn="1"/>
+        </p:nvSpPr>
+        <p:spPr>
+          <a:xfrm>
+            <a:off x="1978930" y="2497428"/>
+            <a:ext cx="1554480" cy="731520"/>
+          </a:xfrm>
+          <a:prstGeom prst="roundRect">
+            <a:avLst>
+              <a:gd name="adj" fmla="val 50000"/>
+            </a:avLst>
+          </a:prstGeom>
+          <a:solidFill>
+            <a:srgbClr val="D9D9D9">
+              <a:alpha val="50000"/>
+            </a:srgbClr>
+          </a:solidFill>
+          <a:ln>
+            <a:noFill/>
+          </a:ln>
+        </p:spPr>
+        <p:style>
+          <a:lnRef idx="2">
+            <a:schemeClr val="accent1">
+              <a:shade val="15000"/>
+            </a:schemeClr>
+          </a:lnRef>
+          <a:fillRef idx="1">
+            <a:schemeClr val="accent1"/>
+          </a:fillRef>
+          <a:effectRef idx="0">
+            <a:schemeClr val="accent1"/>
+          </a:effectRef>
+          <a:fontRef idx="minor">
+            <a:schemeClr val="lt1"/>
+          </a:fontRef>
+        </p:style>
+        <p:txBody>
+          <a:bodyPr rtlCol="0" anchor="t"/>
+          <a:lstStyle/>
+          <a:p>
+            <a:pPr algn="ctr"/>
+            <a:r>
+              <a:rPr lang="en-US" sz="1000" b="1" dirty="0">
+                <a:solidFill>
+                  <a:schemeClr val="tx1"/>
+                </a:solidFill>
+                <a:latin typeface="Arial" panose="020B0604020202020204" pitchFamily="34" charset="0"/>
+                <a:cs typeface="Arial" panose="020B0604020202020204" pitchFamily="34" charset="0"/>
+              </a:rPr>
+              <a:t>ĐIỂM TH BỘ PHẬN</a:t>
+            </a:r>
+            <a:endParaRPr lang="en-AE" sz="1000" b="1" dirty="0">
+              <a:solidFill>
+                <a:schemeClr val="tx1"/>
+              </a:solidFill>
+              <a:latin typeface="Arial" panose="020B0604020202020204" pitchFamily="34" charset="0"/>
+              <a:cs typeface="Arial" panose="020B0604020202020204" pitchFamily="34" charset="0"/>
+            </a:endParaRPr>
+          </a:p>
+        </p:txBody>
+      </p:sp>
+      <p:sp>
+        <p:nvSpPr>
+          <p:cNvPr id="24" name="Rectangle: Rounded Corners 23">
+            <a:extLst>
+              <a:ext uri="{FF2B5EF4-FFF2-40B4-BE49-F238E27FC236}">
+                <a16:creationId xmlns:a16="http://schemas.microsoft.com/office/drawing/2014/main" id="{DA0F010F-BFEF-9D32-5FAB-FD2337C45623}"/>
+              </a:ext>
+            </a:extLst>
+          </p:cNvPr>
+          <p:cNvSpPr/>
+          <p:nvPr userDrawn="1"/>
+        </p:nvSpPr>
+        <p:spPr>
+          <a:xfrm>
+            <a:off x="345600" y="3394656"/>
+            <a:ext cx="1554480" cy="731520"/>
+          </a:xfrm>
+          <a:prstGeom prst="roundRect">
+            <a:avLst>
+              <a:gd name="adj" fmla="val 50000"/>
+            </a:avLst>
+          </a:prstGeom>
+          <a:solidFill>
+            <a:srgbClr val="D9D9D9">
+              <a:alpha val="50000"/>
+            </a:srgbClr>
+          </a:solidFill>
+          <a:ln>
+            <a:noFill/>
+          </a:ln>
+        </p:spPr>
+        <p:style>
+          <a:lnRef idx="2">
+            <a:schemeClr val="accent1">
+              <a:shade val="15000"/>
+            </a:schemeClr>
+          </a:lnRef>
+          <a:fillRef idx="1">
+            <a:schemeClr val="accent1"/>
+          </a:fillRef>
+          <a:effectRef idx="0">
+            <a:schemeClr val="accent1"/>
+          </a:effectRef>
+          <a:fontRef idx="minor">
+            <a:schemeClr val="lt1"/>
+          </a:fontRef>
+        </p:style>
+        <p:txBody>
+          <a:bodyPr rtlCol="0" anchor="t"/>
+          <a:lstStyle/>
+          <a:p>
+            <a:pPr algn="ctr"/>
+            <a:r>
+              <a:rPr lang="en-US" sz="1000" b="1" dirty="0">
+                <a:solidFill>
+                  <a:schemeClr val="tx1"/>
+                </a:solidFill>
+                <a:latin typeface="Arial" panose="020B0604020202020204" pitchFamily="34" charset="0"/>
+                <a:cs typeface="Arial" panose="020B0604020202020204" pitchFamily="34" charset="0"/>
+              </a:rPr>
+              <a:t>% TH CÁ NHÂN</a:t>
+            </a:r>
+            <a:endParaRPr lang="en-AE" sz="1000" b="1" dirty="0">
+              <a:solidFill>
+                <a:schemeClr val="tx1"/>
+              </a:solidFill>
+              <a:latin typeface="Arial" panose="020B0604020202020204" pitchFamily="34" charset="0"/>
+              <a:cs typeface="Arial" panose="020B0604020202020204" pitchFamily="34" charset="0"/>
+            </a:endParaRPr>
+          </a:p>
+        </p:txBody>
+      </p:sp>
+      <p:sp>
+        <p:nvSpPr>
+          <p:cNvPr id="25" name="Rectangle: Rounded Corners 24">
+            <a:extLst>
+              <a:ext uri="{FF2B5EF4-FFF2-40B4-BE49-F238E27FC236}">
+                <a16:creationId xmlns:a16="http://schemas.microsoft.com/office/drawing/2014/main" id="{4722EBEF-5E54-226A-1D03-0F6070B1A74B}"/>
+              </a:ext>
+            </a:extLst>
+          </p:cNvPr>
+          <p:cNvSpPr/>
+          <p:nvPr userDrawn="1"/>
+        </p:nvSpPr>
+        <p:spPr>
+          <a:xfrm>
+            <a:off x="1978930" y="3394656"/>
+            <a:ext cx="1554480" cy="731520"/>
+          </a:xfrm>
+          <a:prstGeom prst="roundRect">
+            <a:avLst>
+              <a:gd name="adj" fmla="val 50000"/>
+            </a:avLst>
+          </a:prstGeom>
+          <a:solidFill>
+            <a:srgbClr val="D9D9D9">
+              <a:alpha val="50000"/>
+            </a:srgbClr>
+          </a:solidFill>
+          <a:ln>
+            <a:noFill/>
+          </a:ln>
+        </p:spPr>
+        <p:style>
+          <a:lnRef idx="2">
+            <a:schemeClr val="accent1">
+              <a:shade val="15000"/>
+            </a:schemeClr>
+          </a:lnRef>
+          <a:fillRef idx="1">
+            <a:schemeClr val="accent1"/>
+          </a:fillRef>
+          <a:effectRef idx="0">
+            <a:schemeClr val="accent1"/>
+          </a:effectRef>
+          <a:fontRef idx="minor">
+            <a:schemeClr val="lt1"/>
+          </a:fontRef>
+        </p:style>
+        <p:txBody>
+          <a:bodyPr rtlCol="0" anchor="t"/>
+          <a:lstStyle/>
+          <a:p>
+            <a:pPr algn="ctr"/>
+            <a:r>
+              <a:rPr lang="en-US" sz="1000" b="1" dirty="0">
+                <a:solidFill>
+                  <a:schemeClr val="tx1"/>
+                </a:solidFill>
+                <a:latin typeface="Arial" panose="020B0604020202020204" pitchFamily="34" charset="0"/>
+                <a:cs typeface="Arial" panose="020B0604020202020204" pitchFamily="34" charset="0"/>
+              </a:rPr>
+              <a:t>% TH BỘ PHẬN</a:t>
+            </a:r>
+            <a:endParaRPr lang="en-AE" sz="1000" b="1" dirty="0">
+              <a:solidFill>
+                <a:schemeClr val="tx1"/>
+              </a:solidFill>
+              <a:latin typeface="Arial" panose="020B0604020202020204" pitchFamily="34" charset="0"/>
+              <a:cs typeface="Arial" panose="020B0604020202020204" pitchFamily="34" charset="0"/>
+            </a:endParaRPr>
+          </a:p>
+        </p:txBody>
+      </p:sp>
+      <p:pic>
+        <p:nvPicPr>
+          <p:cNvPr id="29" name="Picture 28">
+            <a:extLst>
+              <a:ext uri="{FF2B5EF4-FFF2-40B4-BE49-F238E27FC236}">
+                <a16:creationId xmlns:a16="http://schemas.microsoft.com/office/drawing/2014/main" id="{B0CE3BCA-8409-6277-74AC-F1A33416BF27}"/>
+              </a:ext>
+            </a:extLst>
+          </p:cNvPr>
+          <p:cNvPicPr>
+            <a:picLocks noChangeAspect="1"/>
+          </p:cNvPicPr>
+          <p:nvPr userDrawn="1"/>
+        </p:nvPicPr>
+        <p:blipFill>
+          <a:blip r:embed="rId4"/>
+          <a:stretch>
+            <a:fillRect/>
+          </a:stretch>
+        </p:blipFill>
+        <p:spPr>
+          <a:xfrm>
+            <a:off x="336251" y="5070764"/>
+            <a:ext cx="3235004" cy="1293053"/>
+          </a:xfrm>
+          <a:prstGeom prst="rect">
+            <a:avLst/>
+          </a:prstGeom>
+        </p:spPr>
+      </p:pic>
+      <p:sp>
+        <p:nvSpPr>
+          <p:cNvPr id="30" name="Date Placeholder 3">
+            <a:extLst>
+              <a:ext uri="{FF2B5EF4-FFF2-40B4-BE49-F238E27FC236}">
+                <a16:creationId xmlns:a16="http://schemas.microsoft.com/office/drawing/2014/main" id="{DC0A2E8F-D5E3-E458-A03B-D6562F4FA169}"/>
+              </a:ext>
+            </a:extLst>
+          </p:cNvPr>
+          <p:cNvSpPr>
+            <a:spLocks noGrp="1"/>
+          </p:cNvSpPr>
+          <p:nvPr>
+            <p:ph type="dt" sz="half" idx="10"/>
+          </p:nvPr>
+        </p:nvSpPr>
+        <p:spPr>
+          <a:xfrm>
+            <a:off x="409211" y="335209"/>
+            <a:ext cx="4942014" cy="365125"/>
+          </a:xfrm>
+        </p:spPr>
+        <p:txBody>
+          <a:bodyPr/>
+          <a:lstStyle>
+            <a:lvl1pPr>
+              <a:defRPr sz="1600" b="1">
+                <a:solidFill>
+                  <a:schemeClr val="tx1"/>
+                </a:solidFill>
+                <a:latin typeface="Arial" panose="020B0604020202020204" pitchFamily="34" charset="0"/>
+                <a:cs typeface="Arial" panose="020B0604020202020204" pitchFamily="34" charset="0"/>
+              </a:defRPr>
+            </a:lvl1pPr>
+          </a:lstStyle>
+          <a:p>
+            <a:r>
+              <a:rPr lang="en-US" dirty="0"/>
+              <a:t>PERSONAL KPIs DASHBOARD</a:t>
+            </a:r>
+            <a:endParaRPr lang="en-AE" dirty="0"/>
+          </a:p>
+        </p:txBody>
+      </p:sp>
+      <p:pic>
+        <p:nvPicPr>
+          <p:cNvPr id="38" name="Picture 37" descr="A black background with a black square&#10;&#10;AI-generated content may be incorrect.">
+            <a:extLst>
+              <a:ext uri="{FF2B5EF4-FFF2-40B4-BE49-F238E27FC236}">
+                <a16:creationId xmlns:a16="http://schemas.microsoft.com/office/drawing/2014/main" id="{15588EC9-3D21-7B8F-106C-8A15D898D66E}"/>
+              </a:ext>
+            </a:extLst>
+          </p:cNvPr>
+          <p:cNvPicPr>
+            <a:picLocks noChangeAspect="1"/>
+          </p:cNvPicPr>
+          <p:nvPr userDrawn="1"/>
+        </p:nvPicPr>
+        <p:blipFill>
+          <a:blip r:embed="rId5">
+            <a:extLst>
+              <a:ext uri="{28A0092B-C50C-407E-A947-70E740481C1C}">
+                <a14:useLocalDpi xmlns:a14="http://schemas.microsoft.com/office/drawing/2010/main" val="0"/>
+              </a:ext>
+            </a:extLst>
+          </a:blip>
+          <a:stretch>
+            <a:fillRect/>
+          </a:stretch>
+        </p:blipFill>
+        <p:spPr>
+          <a:xfrm>
+            <a:off x="6965001" y="289171"/>
+            <a:ext cx="457200" cy="457200"/>
+          </a:xfrm>
+          <a:prstGeom prst="rect">
+            <a:avLst/>
+          </a:prstGeom>
+        </p:spPr>
+      </p:pic>
+      <p:sp>
+        <p:nvSpPr>
+          <p:cNvPr id="2" name="Date Placeholder 3">
+            <a:extLst>
+              <a:ext uri="{FF2B5EF4-FFF2-40B4-BE49-F238E27FC236}">
+                <a16:creationId xmlns:a16="http://schemas.microsoft.com/office/drawing/2014/main" id="{0EAE258B-4819-698D-766D-5ABB30797BD3}"/>
+              </a:ext>
+            </a:extLst>
+          </p:cNvPr>
+          <p:cNvSpPr txBox="1">
+            <a:spLocks/>
+          </p:cNvSpPr>
+          <p:nvPr userDrawn="1"/>
+        </p:nvSpPr>
+        <p:spPr>
+          <a:xfrm>
+            <a:off x="243840" y="6346226"/>
+            <a:ext cx="3365770" cy="365125"/>
+          </a:xfrm>
+          <a:prstGeom prst="rect">
+            <a:avLst/>
+          </a:prstGeom>
+        </p:spPr>
+        <p:txBody>
+          <a:bodyPr vert="horz" lIns="91440" tIns="45720" rIns="91440" bIns="45720" rtlCol="0" anchor="ctr"/>
+          <a:lstStyle>
+            <a:defPPr>
+              <a:defRPr lang="en-US"/>
+            </a:defPPr>
+            <a:lvl1pPr marL="0" algn="l" defTabSz="914400" rtl="0" eaLnBrk="1" latinLnBrk="0" hangingPunct="1">
+              <a:defRPr sz="1600" b="1" kern="1200">
+                <a:solidFill>
+                  <a:schemeClr val="tx1"/>
+                </a:solidFill>
+                <a:latin typeface="Arial" panose="020B0604020202020204" pitchFamily="34" charset="0"/>
+                <a:ea typeface="+mn-ea"/>
+                <a:cs typeface="Arial" panose="020B0604020202020204" pitchFamily="34" charset="0"/>
+              </a:defRPr>
+            </a:lvl1pPr>
+            <a:lvl2pPr marL="457200" algn="l" defTabSz="914400" rtl="0" eaLnBrk="1" latinLnBrk="0" hangingPunct="1">
+              <a:defRPr sz="1800" kern="1200">
+                <a:solidFill>
+                  <a:schemeClr val="tx1"/>
+                </a:solidFill>
+                <a:latin typeface="+mn-lt"/>
+                <a:ea typeface="+mn-ea"/>
+                <a:cs typeface="+mn-cs"/>
+              </a:defRPr>
+            </a:lvl2pPr>
+            <a:lvl3pPr marL="914400" algn="l" defTabSz="914400" rtl="0" eaLnBrk="1" latinLnBrk="0" hangingPunct="1">
+              <a:defRPr sz="1800" kern="1200">
+                <a:solidFill>
+                  <a:schemeClr val="tx1"/>
+                </a:solidFill>
+                <a:latin typeface="+mn-lt"/>
+                <a:ea typeface="+mn-ea"/>
+                <a:cs typeface="+mn-cs"/>
+              </a:defRPr>
+            </a:lvl3pPr>
+            <a:lvl4pPr marL="1371600" algn="l" defTabSz="914400" rtl="0" eaLnBrk="1" latinLnBrk="0" hangingPunct="1">
+              <a:defRPr sz="1800" kern="1200">
+                <a:solidFill>
+                  <a:schemeClr val="tx1"/>
+                </a:solidFill>
+                <a:latin typeface="+mn-lt"/>
+                <a:ea typeface="+mn-ea"/>
+                <a:cs typeface="+mn-cs"/>
+              </a:defRPr>
+            </a:lvl4pPr>
+            <a:lvl5pPr marL="1828800" algn="l" defTabSz="914400" rtl="0" eaLnBrk="1" latinLnBrk="0" hangingPunct="1">
+              <a:defRPr sz="1800" kern="1200">
+                <a:solidFill>
+                  <a:schemeClr val="tx1"/>
+                </a:solidFill>
+                <a:latin typeface="+mn-lt"/>
+                <a:ea typeface="+mn-ea"/>
+                <a:cs typeface="+mn-cs"/>
+              </a:defRPr>
+            </a:lvl5pPr>
+            <a:lvl6pPr marL="2286000" algn="l" defTabSz="914400" rtl="0" eaLnBrk="1" latinLnBrk="0" hangingPunct="1">
+              <a:defRPr sz="1800" kern="1200">
+                <a:solidFill>
+                  <a:schemeClr val="tx1"/>
+                </a:solidFill>
+                <a:latin typeface="+mn-lt"/>
+                <a:ea typeface="+mn-ea"/>
+                <a:cs typeface="+mn-cs"/>
+              </a:defRPr>
+            </a:lvl6pPr>
+            <a:lvl7pPr marL="2743200" algn="l" defTabSz="914400" rtl="0" eaLnBrk="1" latinLnBrk="0" hangingPunct="1">
+              <a:defRPr sz="1800" kern="1200">
+                <a:solidFill>
+                  <a:schemeClr val="tx1"/>
+                </a:solidFill>
+                <a:latin typeface="+mn-lt"/>
+                <a:ea typeface="+mn-ea"/>
+                <a:cs typeface="+mn-cs"/>
+              </a:defRPr>
+            </a:lvl7pPr>
+            <a:lvl8pPr marL="3200400" algn="l" defTabSz="914400" rtl="0" eaLnBrk="1" latinLnBrk="0" hangingPunct="1">
+              <a:defRPr sz="1800" kern="1200">
+                <a:solidFill>
+                  <a:schemeClr val="tx1"/>
+                </a:solidFill>
+                <a:latin typeface="+mn-lt"/>
+                <a:ea typeface="+mn-ea"/>
+                <a:cs typeface="+mn-cs"/>
+              </a:defRPr>
+            </a:lvl8pPr>
+            <a:lvl9pPr marL="3657600" algn="l" defTabSz="914400" rtl="0" eaLnBrk="1" latinLnBrk="0" hangingPunct="1">
+              <a:defRPr sz="1800" kern="1200">
+                <a:solidFill>
+                  <a:schemeClr val="tx1"/>
+                </a:solidFill>
+                <a:latin typeface="+mn-lt"/>
+                <a:ea typeface="+mn-ea"/>
+                <a:cs typeface="+mn-cs"/>
+              </a:defRPr>
+            </a:lvl9pPr>
+          </a:lstStyle>
+          <a:p>
+            <a:pPr algn="ctr"/>
+            <a:r>
+              <a:rPr lang="en-US" sz="1000" i="0" dirty="0">
+                <a:solidFill>
+                  <a:srgbClr val="BA3030"/>
+                </a:solidFill>
+              </a:rPr>
+              <a:t>⚠️</a:t>
+            </a:r>
+            <a:r>
+              <a:rPr lang="en-US" sz="1000" i="1" dirty="0">
+                <a:solidFill>
+                  <a:srgbClr val="BA3030"/>
+                </a:solidFill>
+              </a:rPr>
+              <a:t> Xem </a:t>
+            </a:r>
+            <a:r>
+              <a:rPr lang="en-US" sz="1000" i="1" dirty="0" err="1">
+                <a:solidFill>
+                  <a:srgbClr val="BA3030"/>
+                </a:solidFill>
+              </a:rPr>
+              <a:t>bảng</a:t>
+            </a:r>
+            <a:r>
+              <a:rPr lang="en-US" sz="1000" i="1" dirty="0">
+                <a:solidFill>
+                  <a:srgbClr val="BA3030"/>
+                </a:solidFill>
+              </a:rPr>
+              <a:t> </a:t>
+            </a:r>
+            <a:r>
+              <a:rPr lang="en-US" sz="1000" i="1" dirty="0" err="1">
+                <a:solidFill>
+                  <a:srgbClr val="BA3030"/>
+                </a:solidFill>
+              </a:rPr>
+              <a:t>quy</a:t>
+            </a:r>
+            <a:r>
+              <a:rPr lang="en-US" sz="1000" i="1" dirty="0">
+                <a:solidFill>
+                  <a:srgbClr val="BA3030"/>
+                </a:solidFill>
+              </a:rPr>
+              <a:t> </a:t>
+            </a:r>
+            <a:r>
+              <a:rPr lang="en-US" sz="1000" i="1" dirty="0" err="1">
+                <a:solidFill>
+                  <a:srgbClr val="BA3030"/>
+                </a:solidFill>
+              </a:rPr>
+              <a:t>đổi</a:t>
+            </a:r>
+            <a:r>
+              <a:rPr lang="en-US" sz="1000" i="1" dirty="0">
+                <a:solidFill>
+                  <a:srgbClr val="BA3030"/>
+                </a:solidFill>
+              </a:rPr>
+              <a:t> </a:t>
+            </a:r>
+            <a:r>
+              <a:rPr lang="en-US" sz="1000" i="1" dirty="0" err="1">
+                <a:solidFill>
+                  <a:srgbClr val="BA3030"/>
+                </a:solidFill>
+              </a:rPr>
+              <a:t>điểm</a:t>
+            </a:r>
+            <a:endParaRPr lang="en-AE" sz="1000" i="1" dirty="0">
+              <a:solidFill>
+                <a:srgbClr val="BA3030"/>
+              </a:solidFill>
+            </a:endParaRPr>
+          </a:p>
+        </p:txBody>
+      </p:sp>
+      <p:sp>
+        <p:nvSpPr>
+          <p:cNvPr id="10" name="Rectangle: Rounded Corners 9">
+            <a:extLst>
+              <a:ext uri="{FF2B5EF4-FFF2-40B4-BE49-F238E27FC236}">
+                <a16:creationId xmlns:a16="http://schemas.microsoft.com/office/drawing/2014/main" id="{D57E1DB1-5A3F-148B-20D7-B87FF8DF5B6E}"/>
+              </a:ext>
+            </a:extLst>
+          </p:cNvPr>
+          <p:cNvSpPr/>
+          <p:nvPr userDrawn="1"/>
+        </p:nvSpPr>
+        <p:spPr>
+          <a:xfrm>
+            <a:off x="345600" y="4291884"/>
+            <a:ext cx="1554480" cy="731520"/>
+          </a:xfrm>
+          <a:prstGeom prst="roundRect">
+            <a:avLst>
+              <a:gd name="adj" fmla="val 50000"/>
+            </a:avLst>
+          </a:prstGeom>
+          <a:solidFill>
+            <a:srgbClr val="D9D9D9">
+              <a:alpha val="50000"/>
+            </a:srgbClr>
+          </a:solidFill>
+          <a:ln>
+            <a:noFill/>
+          </a:ln>
+        </p:spPr>
+        <p:style>
+          <a:lnRef idx="2">
+            <a:schemeClr val="accent1">
+              <a:shade val="15000"/>
+            </a:schemeClr>
+          </a:lnRef>
+          <a:fillRef idx="1">
+            <a:schemeClr val="accent1"/>
+          </a:fillRef>
+          <a:effectRef idx="0">
+            <a:schemeClr val="accent1"/>
+          </a:effectRef>
+          <a:fontRef idx="minor">
+            <a:schemeClr val="lt1"/>
+          </a:fontRef>
+        </p:style>
+        <p:txBody>
+          <a:bodyPr rtlCol="0" anchor="t"/>
+          <a:lstStyle/>
+          <a:p>
+            <a:pPr algn="ctr"/>
+            <a:r>
+              <a:rPr lang="en-US" sz="1000" b="1" dirty="0">
+                <a:solidFill>
+                  <a:schemeClr val="tx1"/>
+                </a:solidFill>
+                <a:latin typeface="Arial" panose="020B0604020202020204" pitchFamily="34" charset="0"/>
+                <a:cs typeface="Arial" panose="020B0604020202020204" pitchFamily="34" charset="0"/>
+              </a:rPr>
+              <a:t>% TH TỔNG</a:t>
+            </a:r>
+            <a:endParaRPr lang="en-AE" sz="1000" b="1" dirty="0">
+              <a:solidFill>
+                <a:schemeClr val="tx1"/>
+              </a:solidFill>
+              <a:latin typeface="Arial" panose="020B0604020202020204" pitchFamily="34" charset="0"/>
+              <a:cs typeface="Arial" panose="020B0604020202020204" pitchFamily="34" charset="0"/>
+            </a:endParaRPr>
+          </a:p>
+        </p:txBody>
+      </p:sp>
+      <p:sp>
+        <p:nvSpPr>
+          <p:cNvPr id="12" name="Rectangle: Rounded Corners 11">
+            <a:extLst>
+              <a:ext uri="{FF2B5EF4-FFF2-40B4-BE49-F238E27FC236}">
+                <a16:creationId xmlns:a16="http://schemas.microsoft.com/office/drawing/2014/main" id="{238F2943-E09B-B6C7-6F55-721804EDEA8C}"/>
+              </a:ext>
+            </a:extLst>
+          </p:cNvPr>
+          <p:cNvSpPr/>
+          <p:nvPr userDrawn="1"/>
+        </p:nvSpPr>
+        <p:spPr>
+          <a:xfrm>
+            <a:off x="1978930" y="4291884"/>
+            <a:ext cx="1554480" cy="731520"/>
+          </a:xfrm>
+          <a:prstGeom prst="roundRect">
+            <a:avLst>
+              <a:gd name="adj" fmla="val 50000"/>
+            </a:avLst>
+          </a:prstGeom>
+          <a:solidFill>
+            <a:srgbClr val="D9D9D9">
+              <a:alpha val="50000"/>
+            </a:srgbClr>
+          </a:solidFill>
+          <a:ln>
+            <a:noFill/>
+          </a:ln>
+        </p:spPr>
+        <p:style>
+          <a:lnRef idx="2">
+            <a:schemeClr val="accent1">
+              <a:shade val="15000"/>
+            </a:schemeClr>
+          </a:lnRef>
+          <a:fillRef idx="1">
+            <a:schemeClr val="accent1"/>
+          </a:fillRef>
+          <a:effectRef idx="0">
+            <a:schemeClr val="accent1"/>
+          </a:effectRef>
+          <a:fontRef idx="minor">
+            <a:schemeClr val="lt1"/>
+          </a:fontRef>
+        </p:style>
+        <p:txBody>
+          <a:bodyPr rtlCol="0" anchor="t"/>
+          <a:lstStyle/>
+          <a:p>
+            <a:pPr algn="ctr"/>
+            <a:r>
+              <a:rPr lang="en-US" sz="800" b="1" dirty="0">
+                <a:solidFill>
+                  <a:schemeClr val="tx1"/>
+                </a:solidFill>
+                <a:latin typeface="Arial" panose="020B0604020202020204" pitchFamily="34" charset="0"/>
+                <a:cs typeface="Arial" panose="020B0604020202020204" pitchFamily="34" charset="0"/>
+              </a:rPr>
+              <a:t>LƯƠNG KINH DOANH</a:t>
+            </a:r>
+            <a:endParaRPr lang="en-AE" sz="800" b="1" dirty="0">
+              <a:solidFill>
+                <a:schemeClr val="tx1"/>
+              </a:solidFill>
+              <a:latin typeface="Arial" panose="020B0604020202020204" pitchFamily="34" charset="0"/>
+              <a:cs typeface="Arial" panose="020B0604020202020204" pitchFamily="34" charset="0"/>
+            </a:endParaRPr>
+          </a:p>
+        </p:txBody>
+      </p:sp>
+    </p:spTree>
+    <p:extLst>
+      <p:ext uri="{BB962C8B-B14F-4D97-AF65-F5344CB8AC3E}">
+        <p14:creationId xmlns:p14="http://schemas.microsoft.com/office/powerpoint/2010/main" val="487508786"/>
+      </p:ext>
+    </p:extLst>
+  </p:cSld>
+  <p:clrMapOvr>
+    <a:masterClrMapping/>
+  </p:clrMapOvr>
+</p:sldLayout>
+</file>
+
+<file path=ppt/slideLayouts/slideLayout3.xml><?xml version="1.0" encoding="utf-8"?>
 <p:sldLayout xmlns:a="http://schemas.openxmlformats.org/drawingml/2006/main" xmlns:r="http://schemas.openxmlformats.org/officeDocument/2006/relationships" xmlns:p="http://schemas.openxmlformats.org/presentationml/2006/main" type="obj" preserve="1">
   <p:cSld name="Title and Content">
     <p:spTree>
@@ -980,7 +3687,7 @@
           <a:p>
             <a:fld id="{D66564CD-D043-413E-A3F3-6D8F6E5015DC}" type="datetimeFigureOut">
               <a:rPr lang="en-AE" smtClean="0"/>
-              <a:t>20/10/2025</a:t>
+              <a:t>28/10/2025</a:t>
             </a:fld>
             <a:endParaRPr lang="en-AE"/>
           </a:p>
@@ -1053,7 +3760,7 @@
 </p:sldLayout>
 </file>
 
-<file path=ppt/slideLayouts/slideLayout3.xml><?xml version="1.0" encoding="utf-8"?>
+<file path=ppt/slideLayouts/slideLayout4.xml><?xml version="1.0" encoding="utf-8"?>
 <p:sldLayout xmlns:a="http://schemas.openxmlformats.org/drawingml/2006/main" xmlns:r="http://schemas.openxmlformats.org/officeDocument/2006/relationships" xmlns:p="http://schemas.openxmlformats.org/presentationml/2006/main" type="secHead" preserve="1">
   <p:cSld name="Section Header">
     <p:spTree>
@@ -1256,7 +3963,7 @@
           <a:p>
             <a:fld id="{D66564CD-D043-413E-A3F3-6D8F6E5015DC}" type="datetimeFigureOut">
               <a:rPr lang="en-AE" smtClean="0"/>
-              <a:t>20/10/2025</a:t>
+              <a:t>28/10/2025</a:t>
             </a:fld>
             <a:endParaRPr lang="en-AE"/>
           </a:p>
@@ -1329,7 +4036,7 @@
 </p:sldLayout>
 </file>
 
-<file path=ppt/slideLayouts/slideLayout4.xml><?xml version="1.0" encoding="utf-8"?>
+<file path=ppt/slideLayouts/slideLayout5.xml><?xml version="1.0" encoding="utf-8"?>
 <p:sldLayout xmlns:a="http://schemas.openxmlformats.org/drawingml/2006/main" xmlns:r="http://schemas.openxmlformats.org/officeDocument/2006/relationships" xmlns:p="http://schemas.openxmlformats.org/presentationml/2006/main" type="twoObj" preserve="1">
   <p:cSld name="Two Content">
     <p:spTree>
@@ -1524,7 +4231,7 @@
           <a:p>
             <a:fld id="{D66564CD-D043-413E-A3F3-6D8F6E5015DC}" type="datetimeFigureOut">
               <a:rPr lang="en-AE" smtClean="0"/>
-              <a:t>20/10/2025</a:t>
+              <a:t>28/10/2025</a:t>
             </a:fld>
             <a:endParaRPr lang="en-AE"/>
           </a:p>
@@ -1597,7 +4304,7 @@
 </p:sldLayout>
 </file>
 
-<file path=ppt/slideLayouts/slideLayout5.xml><?xml version="1.0" encoding="utf-8"?>
+<file path=ppt/slideLayouts/slideLayout6.xml><?xml version="1.0" encoding="utf-8"?>
 <p:sldLayout xmlns:a="http://schemas.openxmlformats.org/drawingml/2006/main" xmlns:r="http://schemas.openxmlformats.org/officeDocument/2006/relationships" xmlns:p="http://schemas.openxmlformats.org/presentationml/2006/main" type="twoTxTwoObj" preserve="1">
   <p:cSld name="Comparison">
     <p:spTree>
@@ -1939,7 +4646,7 @@
           <a:p>
             <a:fld id="{D66564CD-D043-413E-A3F3-6D8F6E5015DC}" type="datetimeFigureOut">
               <a:rPr lang="en-AE" smtClean="0"/>
-              <a:t>20/10/2025</a:t>
+              <a:t>28/10/2025</a:t>
             </a:fld>
             <a:endParaRPr lang="en-AE"/>
           </a:p>
@@ -2012,7 +4719,7 @@
 </p:sldLayout>
 </file>
 
-<file path=ppt/slideLayouts/slideLayout6.xml><?xml version="1.0" encoding="utf-8"?>
+<file path=ppt/slideLayouts/slideLayout7.xml><?xml version="1.0" encoding="utf-8"?>
 <p:sldLayout xmlns:a="http://schemas.openxmlformats.org/drawingml/2006/main" xmlns:r="http://schemas.openxmlformats.org/officeDocument/2006/relationships" xmlns:p="http://schemas.openxmlformats.org/presentationml/2006/main" type="titleOnly" preserve="1">
   <p:cSld name="Title Only">
     <p:spTree>
@@ -2081,7 +4788,7 @@
           <a:p>
             <a:fld id="{D66564CD-D043-413E-A3F3-6D8F6E5015DC}" type="datetimeFigureOut">
               <a:rPr lang="en-AE" smtClean="0"/>
-              <a:t>20/10/2025</a:t>
+              <a:t>28/10/2025</a:t>
             </a:fld>
             <a:endParaRPr lang="en-AE"/>
           </a:p>
@@ -2154,7 +4861,7 @@
 </p:sldLayout>
 </file>
 
-<file path=ppt/slideLayouts/slideLayout7.xml><?xml version="1.0" encoding="utf-8"?>
+<file path=ppt/slideLayouts/slideLayout8.xml><?xml version="1.0" encoding="utf-8"?>
 <p:sldLayout xmlns:a="http://schemas.openxmlformats.org/drawingml/2006/main" xmlns:r="http://schemas.openxmlformats.org/officeDocument/2006/relationships" xmlns:p="http://schemas.openxmlformats.org/presentationml/2006/main" type="blank" preserve="1">
   <p:cSld name="Blank">
     <p:spTree>
@@ -2194,7 +4901,7 @@
           <a:p>
             <a:fld id="{D66564CD-D043-413E-A3F3-6D8F6E5015DC}" type="datetimeFigureOut">
               <a:rPr lang="en-AE" smtClean="0"/>
-              <a:t>20/10/2025</a:t>
+              <a:t>28/10/2025</a:t>
             </a:fld>
             <a:endParaRPr lang="en-AE"/>
           </a:p>
@@ -2267,7 +4974,7 @@
 </p:sldLayout>
 </file>
 
-<file path=ppt/slideLayouts/slideLayout8.xml><?xml version="1.0" encoding="utf-8"?>
+<file path=ppt/slideLayouts/slideLayout9.xml><?xml version="1.0" encoding="utf-8"?>
 <p:sldLayout xmlns:a="http://schemas.openxmlformats.org/drawingml/2006/main" xmlns:r="http://schemas.openxmlformats.org/officeDocument/2006/relationships" xmlns:p="http://schemas.openxmlformats.org/presentationml/2006/main" type="objTx" preserve="1">
   <p:cSld name="Content with Caption">
     <p:spTree>
@@ -2507,7 +5214,7 @@
           <a:p>
             <a:fld id="{D66564CD-D043-413E-A3F3-6D8F6E5015DC}" type="datetimeFigureOut">
               <a:rPr lang="en-AE" smtClean="0"/>
-              <a:t>20/10/2025</a:t>
+              <a:t>28/10/2025</a:t>
             </a:fld>
             <a:endParaRPr lang="en-AE"/>
           </a:p>
@@ -2571,295 +5278,6 @@
     <p:extLst>
       <p:ext uri="{BB962C8B-B14F-4D97-AF65-F5344CB8AC3E}">
         <p14:creationId xmlns:p14="http://schemas.microsoft.com/office/powerpoint/2010/main" val="2318898096"/>
-      </p:ext>
-    </p:extLst>
-  </p:cSld>
-  <p:clrMapOvr>
-    <a:masterClrMapping/>
-  </p:clrMapOvr>
-</p:sldLayout>
-</file>
-
-<file path=ppt/slideLayouts/slideLayout9.xml><?xml version="1.0" encoding="utf-8"?>
-<p:sldLayout xmlns:a="http://schemas.openxmlformats.org/drawingml/2006/main" xmlns:r="http://schemas.openxmlformats.org/officeDocument/2006/relationships" xmlns:p="http://schemas.openxmlformats.org/presentationml/2006/main" type="picTx" preserve="1">
-  <p:cSld name="Picture with Caption">
-    <p:spTree>
-      <p:nvGrpSpPr>
-        <p:cNvPr id="1" name=""/>
-        <p:cNvGrpSpPr/>
-        <p:nvPr/>
-      </p:nvGrpSpPr>
-      <p:grpSpPr>
-        <a:xfrm>
-          <a:off x="0" y="0"/>
-          <a:ext cx="0" cy="0"/>
-          <a:chOff x="0" y="0"/>
-          <a:chExt cx="0" cy="0"/>
-        </a:xfrm>
-      </p:grpSpPr>
-      <p:sp>
-        <p:nvSpPr>
-          <p:cNvPr id="2" name="Title 1">
-            <a:extLst>
-              <a:ext uri="{FF2B5EF4-FFF2-40B4-BE49-F238E27FC236}">
-                <a16:creationId xmlns:a16="http://schemas.microsoft.com/office/drawing/2014/main" id="{ACD1451E-8AA9-B72A-F245-17E7A427F95E}"/>
-              </a:ext>
-            </a:extLst>
-          </p:cNvPr>
-          <p:cNvSpPr>
-            <a:spLocks noGrp="1"/>
-          </p:cNvSpPr>
-          <p:nvPr>
-            <p:ph type="title"/>
-          </p:nvPr>
-        </p:nvSpPr>
-        <p:spPr>
-          <a:xfrm>
-            <a:off x="839788" y="457200"/>
-            <a:ext cx="3932237" cy="1600200"/>
-          </a:xfrm>
-        </p:spPr>
-        <p:txBody>
-          <a:bodyPr anchor="b"/>
-          <a:lstStyle>
-            <a:lvl1pPr>
-              <a:defRPr sz="3200"/>
-            </a:lvl1pPr>
-          </a:lstStyle>
-          <a:p>
-            <a:r>
-              <a:rPr lang="en-US"/>
-              <a:t>Click to edit Master title style</a:t>
-            </a:r>
-            <a:endParaRPr lang="en-AE"/>
-          </a:p>
-        </p:txBody>
-      </p:sp>
-      <p:sp>
-        <p:nvSpPr>
-          <p:cNvPr id="3" name="Picture Placeholder 2">
-            <a:extLst>
-              <a:ext uri="{FF2B5EF4-FFF2-40B4-BE49-F238E27FC236}">
-                <a16:creationId xmlns:a16="http://schemas.microsoft.com/office/drawing/2014/main" id="{0452F916-18CE-E064-E21D-EC26024B0F7E}"/>
-              </a:ext>
-            </a:extLst>
-          </p:cNvPr>
-          <p:cNvSpPr>
-            <a:spLocks noGrp="1"/>
-          </p:cNvSpPr>
-          <p:nvPr>
-            <p:ph type="pic" idx="1"/>
-          </p:nvPr>
-        </p:nvSpPr>
-        <p:spPr>
-          <a:xfrm>
-            <a:off x="5183188" y="987425"/>
-            <a:ext cx="6172200" cy="4873625"/>
-          </a:xfrm>
-        </p:spPr>
-        <p:txBody>
-          <a:bodyPr/>
-          <a:lstStyle>
-            <a:lvl1pPr marL="0" indent="0">
-              <a:buNone/>
-              <a:defRPr sz="3200"/>
-            </a:lvl1pPr>
-            <a:lvl2pPr marL="457200" indent="0">
-              <a:buNone/>
-              <a:defRPr sz="2800"/>
-            </a:lvl2pPr>
-            <a:lvl3pPr marL="914400" indent="0">
-              <a:buNone/>
-              <a:defRPr sz="2400"/>
-            </a:lvl3pPr>
-            <a:lvl4pPr marL="1371600" indent="0">
-              <a:buNone/>
-              <a:defRPr sz="2000"/>
-            </a:lvl4pPr>
-            <a:lvl5pPr marL="1828800" indent="0">
-              <a:buNone/>
-              <a:defRPr sz="2000"/>
-            </a:lvl5pPr>
-            <a:lvl6pPr marL="2286000" indent="0">
-              <a:buNone/>
-              <a:defRPr sz="2000"/>
-            </a:lvl6pPr>
-            <a:lvl7pPr marL="2743200" indent="0">
-              <a:buNone/>
-              <a:defRPr sz="2000"/>
-            </a:lvl7pPr>
-            <a:lvl8pPr marL="3200400" indent="0">
-              <a:buNone/>
-              <a:defRPr sz="2000"/>
-            </a:lvl8pPr>
-            <a:lvl9pPr marL="3657600" indent="0">
-              <a:buNone/>
-              <a:defRPr sz="2000"/>
-            </a:lvl9pPr>
-          </a:lstStyle>
-          <a:p>
-            <a:endParaRPr lang="en-AE"/>
-          </a:p>
-        </p:txBody>
-      </p:sp>
-      <p:sp>
-        <p:nvSpPr>
-          <p:cNvPr id="4" name="Text Placeholder 3">
-            <a:extLst>
-              <a:ext uri="{FF2B5EF4-FFF2-40B4-BE49-F238E27FC236}">
-                <a16:creationId xmlns:a16="http://schemas.microsoft.com/office/drawing/2014/main" id="{823E7212-F9CD-02C4-2E52-6EAB9274C2B3}"/>
-              </a:ext>
-            </a:extLst>
-          </p:cNvPr>
-          <p:cNvSpPr>
-            <a:spLocks noGrp="1"/>
-          </p:cNvSpPr>
-          <p:nvPr>
-            <p:ph type="body" sz="half" idx="2"/>
-          </p:nvPr>
-        </p:nvSpPr>
-        <p:spPr>
-          <a:xfrm>
-            <a:off x="839788" y="2057400"/>
-            <a:ext cx="3932237" cy="3811588"/>
-          </a:xfrm>
-        </p:spPr>
-        <p:txBody>
-          <a:bodyPr/>
-          <a:lstStyle>
-            <a:lvl1pPr marL="0" indent="0">
-              <a:buNone/>
-              <a:defRPr sz="1600"/>
-            </a:lvl1pPr>
-            <a:lvl2pPr marL="457200" indent="0">
-              <a:buNone/>
-              <a:defRPr sz="1400"/>
-            </a:lvl2pPr>
-            <a:lvl3pPr marL="914400" indent="0">
-              <a:buNone/>
-              <a:defRPr sz="1200"/>
-            </a:lvl3pPr>
-            <a:lvl4pPr marL="1371600" indent="0">
-              <a:buNone/>
-              <a:defRPr sz="1000"/>
-            </a:lvl4pPr>
-            <a:lvl5pPr marL="1828800" indent="0">
-              <a:buNone/>
-              <a:defRPr sz="1000"/>
-            </a:lvl5pPr>
-            <a:lvl6pPr marL="2286000" indent="0">
-              <a:buNone/>
-              <a:defRPr sz="1000"/>
-            </a:lvl6pPr>
-            <a:lvl7pPr marL="2743200" indent="0">
-              <a:buNone/>
-              <a:defRPr sz="1000"/>
-            </a:lvl7pPr>
-            <a:lvl8pPr marL="3200400" indent="0">
-              <a:buNone/>
-              <a:defRPr sz="1000"/>
-            </a:lvl8pPr>
-            <a:lvl9pPr marL="3657600" indent="0">
-              <a:buNone/>
-              <a:defRPr sz="1000"/>
-            </a:lvl9pPr>
-          </a:lstStyle>
-          <a:p>
-            <a:pPr lvl="0"/>
-            <a:r>
-              <a:rPr lang="en-US"/>
-              <a:t>Click to edit Master text styles</a:t>
-            </a:r>
-          </a:p>
-        </p:txBody>
-      </p:sp>
-      <p:sp>
-        <p:nvSpPr>
-          <p:cNvPr id="5" name="Date Placeholder 4">
-            <a:extLst>
-              <a:ext uri="{FF2B5EF4-FFF2-40B4-BE49-F238E27FC236}">
-                <a16:creationId xmlns:a16="http://schemas.microsoft.com/office/drawing/2014/main" id="{71EFA156-E3A1-55D2-E947-E39F13DF0432}"/>
-              </a:ext>
-            </a:extLst>
-          </p:cNvPr>
-          <p:cNvSpPr>
-            <a:spLocks noGrp="1"/>
-          </p:cNvSpPr>
-          <p:nvPr>
-            <p:ph type="dt" sz="half" idx="10"/>
-          </p:nvPr>
-        </p:nvSpPr>
-        <p:spPr/>
-        <p:txBody>
-          <a:bodyPr/>
-          <a:lstStyle/>
-          <a:p>
-            <a:fld id="{D66564CD-D043-413E-A3F3-6D8F6E5015DC}" type="datetimeFigureOut">
-              <a:rPr lang="en-AE" smtClean="0"/>
-              <a:t>20/10/2025</a:t>
-            </a:fld>
-            <a:endParaRPr lang="en-AE"/>
-          </a:p>
-        </p:txBody>
-      </p:sp>
-      <p:sp>
-        <p:nvSpPr>
-          <p:cNvPr id="6" name="Footer Placeholder 5">
-            <a:extLst>
-              <a:ext uri="{FF2B5EF4-FFF2-40B4-BE49-F238E27FC236}">
-                <a16:creationId xmlns:a16="http://schemas.microsoft.com/office/drawing/2014/main" id="{04C833BD-43FD-3AED-A5B1-497AD2E1372E}"/>
-              </a:ext>
-            </a:extLst>
-          </p:cNvPr>
-          <p:cNvSpPr>
-            <a:spLocks noGrp="1"/>
-          </p:cNvSpPr>
-          <p:nvPr>
-            <p:ph type="ftr" sz="quarter" idx="11"/>
-          </p:nvPr>
-        </p:nvSpPr>
-        <p:spPr/>
-        <p:txBody>
-          <a:bodyPr/>
-          <a:lstStyle/>
-          <a:p>
-            <a:endParaRPr lang="en-AE"/>
-          </a:p>
-        </p:txBody>
-      </p:sp>
-      <p:sp>
-        <p:nvSpPr>
-          <p:cNvPr id="7" name="Slide Number Placeholder 6">
-            <a:extLst>
-              <a:ext uri="{FF2B5EF4-FFF2-40B4-BE49-F238E27FC236}">
-                <a16:creationId xmlns:a16="http://schemas.microsoft.com/office/drawing/2014/main" id="{9833B89C-D38C-91F3-A418-E9333C584B5E}"/>
-              </a:ext>
-            </a:extLst>
-          </p:cNvPr>
-          <p:cNvSpPr>
-            <a:spLocks noGrp="1"/>
-          </p:cNvSpPr>
-          <p:nvPr>
-            <p:ph type="sldNum" sz="quarter" idx="12"/>
-          </p:nvPr>
-        </p:nvSpPr>
-        <p:spPr/>
-        <p:txBody>
-          <a:bodyPr/>
-          <a:lstStyle/>
-          <a:p>
-            <a:fld id="{07175E78-BEE4-4AAB-93F0-CD7B33C308AB}" type="slidenum">
-              <a:rPr lang="en-AE" smtClean="0"/>
-              <a:t>‹#›</a:t>
-            </a:fld>
-            <a:endParaRPr lang="en-AE"/>
-          </a:p>
-        </p:txBody>
-      </p:sp>
-    </p:spTree>
-    <p:extLst>
-      <p:ext uri="{BB962C8B-B14F-4D97-AF65-F5344CB8AC3E}">
-        <p14:creationId xmlns:p14="http://schemas.microsoft.com/office/powerpoint/2010/main" val="1891507514"/>
       </p:ext>
     </p:extLst>
   </p:cSld>
@@ -3039,7 +5457,7 @@
           <a:p>
             <a:fld id="{D66564CD-D043-413E-A3F3-6D8F6E5015DC}" type="datetimeFigureOut">
               <a:rPr lang="en-AE" smtClean="0"/>
-              <a:t>20/10/2025</a:t>
+              <a:t>28/10/2025</a:t>
             </a:fld>
             <a:endParaRPr lang="en-AE"/>
           </a:p>
@@ -3145,16 +5563,17 @@
   <p:clrMap bg1="lt1" tx1="dk1" bg2="lt2" tx2="dk2" accent1="accent1" accent2="accent2" accent3="accent3" accent4="accent4" accent5="accent5" accent6="accent6" hlink="hlink" folHlink="folHlink"/>
   <p:sldLayoutIdLst>
     <p:sldLayoutId id="2147483649" r:id="rId1"/>
-    <p:sldLayoutId id="2147483650" r:id="rId2"/>
-    <p:sldLayoutId id="2147483651" r:id="rId3"/>
-    <p:sldLayoutId id="2147483652" r:id="rId4"/>
-    <p:sldLayoutId id="2147483653" r:id="rId5"/>
-    <p:sldLayoutId id="2147483654" r:id="rId6"/>
-    <p:sldLayoutId id="2147483655" r:id="rId7"/>
-    <p:sldLayoutId id="2147483656" r:id="rId8"/>
-    <p:sldLayoutId id="2147483657" r:id="rId9"/>
-    <p:sldLayoutId id="2147483658" r:id="rId10"/>
-    <p:sldLayoutId id="2147483659" r:id="rId11"/>
+    <p:sldLayoutId id="2147483660" r:id="rId2"/>
+    <p:sldLayoutId id="2147483650" r:id="rId3"/>
+    <p:sldLayoutId id="2147483651" r:id="rId4"/>
+    <p:sldLayoutId id="2147483652" r:id="rId5"/>
+    <p:sldLayoutId id="2147483653" r:id="rId6"/>
+    <p:sldLayoutId id="2147483654" r:id="rId7"/>
+    <p:sldLayoutId id="2147483655" r:id="rId8"/>
+    <p:sldLayoutId id="2147483656" r:id="rId9"/>
+    <p:sldLayoutId id="2147483657" r:id="rId10"/>
+    <p:sldLayoutId id="2147483658" r:id="rId11"/>
+    <p:sldLayoutId id="2147483659" r:id="rId12"/>
   </p:sldLayoutIdLst>
   <p:txStyles>
     <p:titleStyle>
@@ -3456,229 +5875,40 @@
           <a:chExt cx="0" cy="0"/>
         </a:xfrm>
       </p:grpSpPr>
-      <p:sp>
-        <p:nvSpPr>
-          <p:cNvPr id="20" name="Rectangle: Rounded Corners 19">
-            <a:extLst>
-              <a:ext uri="{FF2B5EF4-FFF2-40B4-BE49-F238E27FC236}">
-                <a16:creationId xmlns:a16="http://schemas.microsoft.com/office/drawing/2014/main" id="{1A5F72C0-D89F-68FC-B5E2-1A752D9954A0}"/>
-              </a:ext>
-            </a:extLst>
-          </p:cNvPr>
-          <p:cNvSpPr/>
-          <p:nvPr/>
-        </p:nvSpPr>
-        <p:spPr>
-          <a:xfrm>
-            <a:off x="238893" y="2391556"/>
-            <a:ext cx="3386809" cy="4307948"/>
-          </a:xfrm>
-          <a:prstGeom prst="roundRect">
-            <a:avLst>
-              <a:gd name="adj" fmla="val 4684"/>
-            </a:avLst>
-          </a:prstGeom>
-          <a:solidFill>
-            <a:schemeClr val="bg1"/>
-          </a:solidFill>
-          <a:ln>
-            <a:noFill/>
-          </a:ln>
-        </p:spPr>
-        <p:style>
-          <a:lnRef idx="2">
-            <a:schemeClr val="accent1">
-              <a:shade val="15000"/>
-            </a:schemeClr>
-          </a:lnRef>
-          <a:fillRef idx="1">
-            <a:schemeClr val="accent1"/>
-          </a:fillRef>
-          <a:effectRef idx="0">
-            <a:schemeClr val="accent1"/>
-          </a:effectRef>
-          <a:fontRef idx="minor">
-            <a:schemeClr val="lt1"/>
-          </a:fontRef>
-        </p:style>
-        <p:txBody>
-          <a:bodyPr rtlCol="0" anchor="ctr"/>
-          <a:lstStyle/>
-          <a:p>
-            <a:pPr algn="ctr"/>
-            <a:endParaRPr lang="en-AE"/>
-          </a:p>
-        </p:txBody>
-      </p:sp>
-      <p:sp>
-        <p:nvSpPr>
-          <p:cNvPr id="14" name="Rectangle: Rounded Corners 13">
-            <a:extLst>
-              <a:ext uri="{FF2B5EF4-FFF2-40B4-BE49-F238E27FC236}">
-                <a16:creationId xmlns:a16="http://schemas.microsoft.com/office/drawing/2014/main" id="{FD7693C0-B618-48C6-B82A-6509341D1004}"/>
-              </a:ext>
-            </a:extLst>
-          </p:cNvPr>
-          <p:cNvSpPr/>
-          <p:nvPr/>
-        </p:nvSpPr>
-        <p:spPr>
-          <a:xfrm>
-            <a:off x="3815429" y="1133445"/>
-            <a:ext cx="8137678" cy="2743200"/>
-          </a:xfrm>
-          <a:prstGeom prst="roundRect">
-            <a:avLst>
-              <a:gd name="adj" fmla="val 4684"/>
-            </a:avLst>
-          </a:prstGeom>
-          <a:solidFill>
-            <a:schemeClr val="bg1"/>
-          </a:solidFill>
-          <a:ln>
-            <a:noFill/>
-          </a:ln>
-        </p:spPr>
-        <p:style>
-          <a:lnRef idx="2">
-            <a:schemeClr val="accent1">
-              <a:shade val="15000"/>
-            </a:schemeClr>
-          </a:lnRef>
-          <a:fillRef idx="1">
-            <a:schemeClr val="accent1"/>
-          </a:fillRef>
-          <a:effectRef idx="0">
-            <a:schemeClr val="accent1"/>
-          </a:effectRef>
-          <a:fontRef idx="minor">
-            <a:schemeClr val="lt1"/>
-          </a:fontRef>
-        </p:style>
-        <p:txBody>
-          <a:bodyPr rtlCol="0" anchor="ctr"/>
-          <a:lstStyle/>
-          <a:p>
-            <a:pPr algn="ctr"/>
-            <a:endParaRPr lang="en-AE"/>
-          </a:p>
-        </p:txBody>
-      </p:sp>
-      <p:sp>
-        <p:nvSpPr>
-          <p:cNvPr id="16" name="Rectangle: Rounded Corners 15">
-            <a:extLst>
-              <a:ext uri="{FF2B5EF4-FFF2-40B4-BE49-F238E27FC236}">
-                <a16:creationId xmlns:a16="http://schemas.microsoft.com/office/drawing/2014/main" id="{E1553AB8-6C8D-A11E-282E-35222ECFD5A8}"/>
-              </a:ext>
-            </a:extLst>
-          </p:cNvPr>
-          <p:cNvSpPr/>
-          <p:nvPr/>
-        </p:nvSpPr>
-        <p:spPr>
-          <a:xfrm>
-            <a:off x="3815429" y="3956304"/>
-            <a:ext cx="8137678" cy="2743200"/>
-          </a:xfrm>
-          <a:prstGeom prst="roundRect">
-            <a:avLst>
-              <a:gd name="adj" fmla="val 4684"/>
-            </a:avLst>
-          </a:prstGeom>
-          <a:solidFill>
-            <a:schemeClr val="bg1"/>
-          </a:solidFill>
-          <a:ln>
-            <a:noFill/>
-          </a:ln>
-        </p:spPr>
-        <p:style>
-          <a:lnRef idx="2">
-            <a:schemeClr val="accent1">
-              <a:shade val="15000"/>
-            </a:schemeClr>
-          </a:lnRef>
-          <a:fillRef idx="1">
-            <a:schemeClr val="accent1"/>
-          </a:fillRef>
-          <a:effectRef idx="0">
-            <a:schemeClr val="accent1"/>
-          </a:effectRef>
-          <a:fontRef idx="minor">
-            <a:schemeClr val="lt1"/>
-          </a:fontRef>
-        </p:style>
-        <p:txBody>
-          <a:bodyPr rtlCol="0" anchor="ctr"/>
-          <a:lstStyle/>
-          <a:p>
-            <a:pPr algn="ctr"/>
-            <a:endParaRPr lang="en-AE"/>
-          </a:p>
-        </p:txBody>
-      </p:sp>
-      <p:sp>
-        <p:nvSpPr>
-          <p:cNvPr id="17" name="Rectangle: Rounded Corners 16">
-            <a:extLst>
-              <a:ext uri="{FF2B5EF4-FFF2-40B4-BE49-F238E27FC236}">
-                <a16:creationId xmlns:a16="http://schemas.microsoft.com/office/drawing/2014/main" id="{536E9A2C-64F8-E13F-F884-F08B4E95864C}"/>
-              </a:ext>
-            </a:extLst>
-          </p:cNvPr>
-          <p:cNvSpPr/>
-          <p:nvPr/>
-        </p:nvSpPr>
-        <p:spPr>
-          <a:xfrm>
-            <a:off x="560697" y="2514600"/>
-            <a:ext cx="1371600" cy="914400"/>
-          </a:xfrm>
-          <a:prstGeom prst="roundRect">
-            <a:avLst>
-              <a:gd name="adj" fmla="val 24897"/>
-            </a:avLst>
-          </a:prstGeom>
-          <a:solidFill>
-            <a:schemeClr val="accent6">
-              <a:lumMod val="20000"/>
-              <a:lumOff val="80000"/>
-            </a:schemeClr>
-          </a:solidFill>
-          <a:ln>
-            <a:noFill/>
-          </a:ln>
-        </p:spPr>
-        <p:style>
-          <a:lnRef idx="2">
-            <a:schemeClr val="accent1">
-              <a:shade val="15000"/>
-            </a:schemeClr>
-          </a:lnRef>
-          <a:fillRef idx="1">
-            <a:schemeClr val="accent1"/>
-          </a:fillRef>
-          <a:effectRef idx="0">
-            <a:schemeClr val="accent1"/>
-          </a:effectRef>
-          <a:fontRef idx="minor">
-            <a:schemeClr val="lt1"/>
-          </a:fontRef>
-        </p:style>
-        <p:txBody>
-          <a:bodyPr rtlCol="0" anchor="ctr"/>
-          <a:lstStyle/>
-          <a:p>
-            <a:pPr algn="ctr"/>
-            <a:endParaRPr lang="en-AE"/>
-          </a:p>
-        </p:txBody>
-      </p:sp>
     </p:spTree>
     <p:extLst>
       <p:ext uri="{BB962C8B-B14F-4D97-AF65-F5344CB8AC3E}">
         <p14:creationId xmlns:p14="http://schemas.microsoft.com/office/powerpoint/2010/main" val="3609433683"/>
+      </p:ext>
+    </p:extLst>
+  </p:cSld>
+  <p:clrMapOvr>
+    <a:masterClrMapping/>
+  </p:clrMapOvr>
+</p:sld>
+</file>
+
+<file path=ppt/slides/slide2.xml><?xml version="1.0" encoding="utf-8"?>
+<p:sld xmlns:a="http://schemas.openxmlformats.org/drawingml/2006/main" xmlns:r="http://schemas.openxmlformats.org/officeDocument/2006/relationships" xmlns:p="http://schemas.openxmlformats.org/presentationml/2006/main">
+  <p:cSld>
+    <p:spTree>
+      <p:nvGrpSpPr>
+        <p:cNvPr id="1" name=""/>
+        <p:cNvGrpSpPr/>
+        <p:nvPr/>
+      </p:nvGrpSpPr>
+      <p:grpSpPr>
+        <a:xfrm>
+          <a:off x="0" y="0"/>
+          <a:ext cx="0" cy="0"/>
+          <a:chOff x="0" y="0"/>
+          <a:chExt cx="0" cy="0"/>
+        </a:xfrm>
+      </p:grpSpPr>
+    </p:spTree>
+    <p:extLst>
+      <p:ext uri="{BB962C8B-B14F-4D97-AF65-F5344CB8AC3E}">
+        <p14:creationId xmlns:p14="http://schemas.microsoft.com/office/powerpoint/2010/main" val="4231280831"/>
       </p:ext>
     </p:extLst>
   </p:cSld>
@@ -4001,4 +6231,319 @@
     </a:ext>
   </a:extLst>
 </a:theme>
+</file>
+
+<file path=ppt/theme/theme2.xml><?xml version="1.0" encoding="utf-8"?>
+<a:theme xmlns:a="http://schemas.openxmlformats.org/drawingml/2006/main" name="Office Theme">
+  <a:themeElements>
+    <a:clrScheme name="Office">
+      <a:dk1>
+        <a:sysClr val="windowText" lastClr="000000"/>
+      </a:dk1>
+      <a:lt1>
+        <a:sysClr val="window" lastClr="FFFFFF"/>
+      </a:lt1>
+      <a:dk2>
+        <a:srgbClr val="0E2841"/>
+      </a:dk2>
+      <a:lt2>
+        <a:srgbClr val="E8E8E8"/>
+      </a:lt2>
+      <a:accent1>
+        <a:srgbClr val="156082"/>
+      </a:accent1>
+      <a:accent2>
+        <a:srgbClr val="E97132"/>
+      </a:accent2>
+      <a:accent3>
+        <a:srgbClr val="196B24"/>
+      </a:accent3>
+      <a:accent4>
+        <a:srgbClr val="0F9ED5"/>
+      </a:accent4>
+      <a:accent5>
+        <a:srgbClr val="A02B93"/>
+      </a:accent5>
+      <a:accent6>
+        <a:srgbClr val="4EA72E"/>
+      </a:accent6>
+      <a:hlink>
+        <a:srgbClr val="467886"/>
+      </a:hlink>
+      <a:folHlink>
+        <a:srgbClr val="96607D"/>
+      </a:folHlink>
+    </a:clrScheme>
+    <a:fontScheme name="Office">
+      <a:majorFont>
+        <a:latin typeface="Aptos Display" panose="02110004020202020204"/>
+        <a:ea typeface=""/>
+        <a:cs typeface=""/>
+        <a:font script="Jpan" typeface="游ゴシック Light"/>
+        <a:font script="Hang" typeface="맑은 고딕"/>
+        <a:font script="Hans" typeface="等线 Light"/>
+        <a:font script="Hant" typeface="新細明體"/>
+        <a:font script="Arab" typeface="Times New Roman"/>
+        <a:font script="Hebr" typeface="Times New Roman"/>
+        <a:font script="Thai" typeface="Angsana New"/>
+        <a:font script="Ethi" typeface="Nyala"/>
+        <a:font script="Beng" typeface="Vrinda"/>
+        <a:font script="Gujr" typeface="Shruti"/>
+        <a:font script="Khmr" typeface="MoolBoran"/>
+        <a:font script="Knda" typeface="Tunga"/>
+        <a:font script="Guru" typeface="Raavi"/>
+        <a:font script="Cans" typeface="Euphemia"/>
+        <a:font script="Cher" typeface="Plantagenet Cherokee"/>
+        <a:font script="Yiii" typeface="Microsoft Yi Baiti"/>
+        <a:font script="Tibt" typeface="Microsoft Himalaya"/>
+        <a:font script="Thaa" typeface="MV Boli"/>
+        <a:font script="Deva" typeface="Mangal"/>
+        <a:font script="Telu" typeface="Gautami"/>
+        <a:font script="Taml" typeface="Latha"/>
+        <a:font script="Syrc" typeface="Estrangelo Edessa"/>
+        <a:font script="Orya" typeface="Kalinga"/>
+        <a:font script="Mlym" typeface="Kartika"/>
+        <a:font script="Laoo" typeface="DokChampa"/>
+        <a:font script="Sinh" typeface="Iskoola Pota"/>
+        <a:font script="Mong" typeface="Mongolian Baiti"/>
+        <a:font script="Viet" typeface="Times New Roman"/>
+        <a:font script="Uigh" typeface="Microsoft Uighur"/>
+        <a:font script="Geor" typeface="Sylfaen"/>
+        <a:font script="Armn" typeface="Arial"/>
+        <a:font script="Bugi" typeface="Leelawadee UI"/>
+        <a:font script="Bopo" typeface="Microsoft JhengHei"/>
+        <a:font script="Java" typeface="Javanese Text"/>
+        <a:font script="Lisu" typeface="Segoe UI"/>
+        <a:font script="Mymr" typeface="Myanmar Text"/>
+        <a:font script="Nkoo" typeface="Ebrima"/>
+        <a:font script="Olck" typeface="Nirmala UI"/>
+        <a:font script="Osma" typeface="Ebrima"/>
+        <a:font script="Phag" typeface="Phagspa"/>
+        <a:font script="Syrn" typeface="Estrangelo Edessa"/>
+        <a:font script="Syrj" typeface="Estrangelo Edessa"/>
+        <a:font script="Syre" typeface="Estrangelo Edessa"/>
+        <a:font script="Sora" typeface="Nirmala UI"/>
+        <a:font script="Tale" typeface="Microsoft Tai Le"/>
+        <a:font script="Talu" typeface="Microsoft New Tai Lue"/>
+        <a:font script="Tfng" typeface="Ebrima"/>
+      </a:majorFont>
+      <a:minorFont>
+        <a:latin typeface="Aptos" panose="02110004020202020204"/>
+        <a:ea typeface=""/>
+        <a:cs typeface=""/>
+        <a:font script="Jpan" typeface="游ゴシック"/>
+        <a:font script="Hang" typeface="맑은 고딕"/>
+        <a:font script="Hans" typeface="等线"/>
+        <a:font script="Hant" typeface="新細明體"/>
+        <a:font script="Arab" typeface="Arial"/>
+        <a:font script="Hebr" typeface="Arial"/>
+        <a:font script="Thai" typeface="Cordia New"/>
+        <a:font script="Ethi" typeface="Nyala"/>
+        <a:font script="Beng" typeface="Vrinda"/>
+        <a:font script="Gujr" typeface="Shruti"/>
+        <a:font script="Khmr" typeface="DaunPenh"/>
+        <a:font script="Knda" typeface="Tunga"/>
+        <a:font script="Guru" typeface="Raavi"/>
+        <a:font script="Cans" typeface="Euphemia"/>
+        <a:font script="Cher" typeface="Plantagenet Cherokee"/>
+        <a:font script="Yiii" typeface="Microsoft Yi Baiti"/>
+        <a:font script="Tibt" typeface="Microsoft Himalaya"/>
+        <a:font script="Thaa" typeface="MV Boli"/>
+        <a:font script="Deva" typeface="Mangal"/>
+        <a:font script="Telu" typeface="Gautami"/>
+        <a:font script="Taml" typeface="Latha"/>
+        <a:font script="Syrc" typeface="Estrangelo Edessa"/>
+        <a:font script="Orya" typeface="Kalinga"/>
+        <a:font script="Mlym" typeface="Kartika"/>
+        <a:font script="Laoo" typeface="DokChampa"/>
+        <a:font script="Sinh" typeface="Iskoola Pota"/>
+        <a:font script="Mong" typeface="Mongolian Baiti"/>
+        <a:font script="Viet" typeface="Arial"/>
+        <a:font script="Uigh" typeface="Microsoft Uighur"/>
+        <a:font script="Geor" typeface="Sylfaen"/>
+        <a:font script="Armn" typeface="Arial"/>
+        <a:font script="Bugi" typeface="Leelawadee UI"/>
+        <a:font script="Bopo" typeface="Microsoft JhengHei"/>
+        <a:font script="Java" typeface="Javanese Text"/>
+        <a:font script="Lisu" typeface="Segoe UI"/>
+        <a:font script="Mymr" typeface="Myanmar Text"/>
+        <a:font script="Nkoo" typeface="Ebrima"/>
+        <a:font script="Olck" typeface="Nirmala UI"/>
+        <a:font script="Osma" typeface="Ebrima"/>
+        <a:font script="Phag" typeface="Phagspa"/>
+        <a:font script="Syrn" typeface="Estrangelo Edessa"/>
+        <a:font script="Syrj" typeface="Estrangelo Edessa"/>
+        <a:font script="Syre" typeface="Estrangelo Edessa"/>
+        <a:font script="Sora" typeface="Nirmala UI"/>
+        <a:font script="Tale" typeface="Microsoft Tai Le"/>
+        <a:font script="Talu" typeface="Microsoft New Tai Lue"/>
+        <a:font script="Tfng" typeface="Ebrima"/>
+      </a:minorFont>
+    </a:fontScheme>
+    <a:fmtScheme name="Office">
+      <a:fillStyleLst>
+        <a:solidFill>
+          <a:schemeClr val="phClr"/>
+        </a:solidFill>
+        <a:gradFill rotWithShape="1">
+          <a:gsLst>
+            <a:gs pos="0">
+              <a:schemeClr val="phClr">
+                <a:lumMod val="110000"/>
+                <a:satMod val="105000"/>
+                <a:tint val="67000"/>
+              </a:schemeClr>
+            </a:gs>
+            <a:gs pos="50000">
+              <a:schemeClr val="phClr">
+                <a:lumMod val="105000"/>
+                <a:satMod val="103000"/>
+                <a:tint val="73000"/>
+              </a:schemeClr>
+            </a:gs>
+            <a:gs pos="100000">
+              <a:schemeClr val="phClr">
+                <a:lumMod val="105000"/>
+                <a:satMod val="109000"/>
+                <a:tint val="81000"/>
+              </a:schemeClr>
+            </a:gs>
+          </a:gsLst>
+          <a:lin ang="5400000" scaled="0"/>
+        </a:gradFill>
+        <a:gradFill rotWithShape="1">
+          <a:gsLst>
+            <a:gs pos="0">
+              <a:schemeClr val="phClr">
+                <a:satMod val="103000"/>
+                <a:lumMod val="102000"/>
+                <a:tint val="94000"/>
+              </a:schemeClr>
+            </a:gs>
+            <a:gs pos="50000">
+              <a:schemeClr val="phClr">
+                <a:satMod val="110000"/>
+                <a:lumMod val="100000"/>
+                <a:shade val="100000"/>
+              </a:schemeClr>
+            </a:gs>
+            <a:gs pos="100000">
+              <a:schemeClr val="phClr">
+                <a:lumMod val="99000"/>
+                <a:satMod val="120000"/>
+                <a:shade val="78000"/>
+              </a:schemeClr>
+            </a:gs>
+          </a:gsLst>
+          <a:lin ang="5400000" scaled="0"/>
+        </a:gradFill>
+      </a:fillStyleLst>
+      <a:lnStyleLst>
+        <a:ln w="12700" cap="flat" cmpd="sng" algn="ctr">
+          <a:solidFill>
+            <a:schemeClr val="phClr"/>
+          </a:solidFill>
+          <a:prstDash val="solid"/>
+          <a:miter lim="800000"/>
+        </a:ln>
+        <a:ln w="19050" cap="flat" cmpd="sng" algn="ctr">
+          <a:solidFill>
+            <a:schemeClr val="phClr"/>
+          </a:solidFill>
+          <a:prstDash val="solid"/>
+          <a:miter lim="800000"/>
+        </a:ln>
+        <a:ln w="25400" cap="flat" cmpd="sng" algn="ctr">
+          <a:solidFill>
+            <a:schemeClr val="phClr"/>
+          </a:solidFill>
+          <a:prstDash val="solid"/>
+          <a:miter lim="800000"/>
+        </a:ln>
+      </a:lnStyleLst>
+      <a:effectStyleLst>
+        <a:effectStyle>
+          <a:effectLst/>
+        </a:effectStyle>
+        <a:effectStyle>
+          <a:effectLst/>
+        </a:effectStyle>
+        <a:effectStyle>
+          <a:effectLst>
+            <a:outerShdw blurRad="57150" dist="19050" dir="5400000" algn="ctr" rotWithShape="0">
+              <a:srgbClr val="000000">
+                <a:alpha val="63000"/>
+              </a:srgbClr>
+            </a:outerShdw>
+          </a:effectLst>
+        </a:effectStyle>
+      </a:effectStyleLst>
+      <a:bgFillStyleLst>
+        <a:solidFill>
+          <a:schemeClr val="phClr"/>
+        </a:solidFill>
+        <a:solidFill>
+          <a:schemeClr val="phClr">
+            <a:tint val="95000"/>
+            <a:satMod val="170000"/>
+          </a:schemeClr>
+        </a:solidFill>
+        <a:gradFill rotWithShape="1">
+          <a:gsLst>
+            <a:gs pos="0">
+              <a:schemeClr val="phClr">
+                <a:tint val="93000"/>
+                <a:satMod val="150000"/>
+                <a:shade val="98000"/>
+                <a:lumMod val="102000"/>
+              </a:schemeClr>
+            </a:gs>
+            <a:gs pos="50000">
+              <a:schemeClr val="phClr">
+                <a:tint val="98000"/>
+                <a:satMod val="130000"/>
+                <a:shade val="90000"/>
+                <a:lumMod val="103000"/>
+              </a:schemeClr>
+            </a:gs>
+            <a:gs pos="100000">
+              <a:schemeClr val="phClr">
+                <a:shade val="63000"/>
+                <a:satMod val="120000"/>
+              </a:schemeClr>
+            </a:gs>
+          </a:gsLst>
+          <a:lin ang="5400000" scaled="0"/>
+        </a:gradFill>
+      </a:bgFillStyleLst>
+    </a:fmtScheme>
+  </a:themeElements>
+  <a:objectDefaults>
+    <a:lnDef>
+      <a:spPr/>
+      <a:bodyPr/>
+      <a:lstStyle/>
+      <a:style>
+        <a:lnRef idx="2">
+          <a:schemeClr val="accent1"/>
+        </a:lnRef>
+        <a:fillRef idx="0">
+          <a:schemeClr val="accent1"/>
+        </a:fillRef>
+        <a:effectRef idx="1">
+          <a:schemeClr val="accent1"/>
+        </a:effectRef>
+        <a:fontRef idx="minor">
+          <a:schemeClr val="tx1"/>
+        </a:fontRef>
+      </a:style>
+    </a:lnDef>
+  </a:objectDefaults>
+  <a:extraClrSchemeLst/>
+  <a:extLst>
+    <a:ext uri="{05A4C25C-085E-4340-85A3-A5531E510DB2}">
+      <thm15:themeFamily xmlns:thm15="http://schemas.microsoft.com/office/thememl/2012/main" name="Office Theme" id="{2E142A2C-CD16-42D6-873A-C26D2A0506FA}" vid="{1BDDFF52-6CD6-40A5-AB3C-68EB2F1E4D0A}"/>
+    </a:ext>
+  </a:extLst>
+</a:theme>
 </file>
</xml_diff>